<commit_message>
Updated work from 1st Dec
</commit_message>
<xml_diff>
--- a/Game Design (Dissertation)/Interum Project Presentation/Final Interim Project Pitch (America Down Under).pptx
+++ b/Game Design (Dissertation)/Interum Project Presentation/Final Interim Project Pitch (America Down Under).pptx
@@ -8,15 +8,18 @@
     <p:sldId id="257" r:id="rId2"/>
     <p:sldId id="267" r:id="rId3"/>
     <p:sldId id="260" r:id="rId4"/>
-    <p:sldId id="258" r:id="rId5"/>
-    <p:sldId id="262" r:id="rId6"/>
-    <p:sldId id="263" r:id="rId7"/>
-    <p:sldId id="264" r:id="rId8"/>
-    <p:sldId id="259" r:id="rId9"/>
-    <p:sldId id="261" r:id="rId10"/>
-    <p:sldId id="268" r:id="rId11"/>
-    <p:sldId id="265" r:id="rId12"/>
-    <p:sldId id="269" r:id="rId13"/>
+    <p:sldId id="272" r:id="rId5"/>
+    <p:sldId id="271" r:id="rId6"/>
+    <p:sldId id="270" r:id="rId7"/>
+    <p:sldId id="263" r:id="rId8"/>
+    <p:sldId id="261" r:id="rId9"/>
+    <p:sldId id="262" r:id="rId10"/>
+    <p:sldId id="273" r:id="rId11"/>
+    <p:sldId id="259" r:id="rId12"/>
+    <p:sldId id="268" r:id="rId13"/>
+    <p:sldId id="265" r:id="rId14"/>
+    <p:sldId id="274" r:id="rId15"/>
+    <p:sldId id="269" r:id="rId16"/>
   </p:sldIdLst>
   <p:sldSz cx="12192000" cy="6858000"/>
   <p:notesSz cx="6858000" cy="9144000"/>
@@ -186,9 +189,9 @@
 
 <file path=ppt/comments/comment3.xml><?xml version="1.0" encoding="utf-8"?>
 <p:cmLst xmlns:a="http://schemas.openxmlformats.org/drawingml/2006/main" xmlns:r="http://schemas.openxmlformats.org/officeDocument/2006/relationships" xmlns:p="http://schemas.openxmlformats.org/presentationml/2006/main">
-  <p:cm authorId="1" dt="2019-11-07T15:36:28.464" idx="21">
+  <p:cm authorId="1" dt="2019-11-11T14:39:07.142" idx="28">
     <p:pos x="10" y="10"/>
-    <p:text>The players will encounter different ways to defeat political rivals or if they choose to they can avoid them to progress. The players challeneg increases each time the progress towards the Mexican border. If the players explore more they will have more chance of encountering articals before the war and understand why there character is so bad.</p:text>
+    <p:text>My game is targetted towards the AAA consoles and Games PC's due to the grafical demands and gameplay. Target Age is 16+ who are into tactical, exploring and  competition.</p:text>
     <p:extLst>
       <p:ext uri="{C676402C-5697-4E1C-873F-D02D1690AC5C}">
         <p15:threadingInfo xmlns:p15="http://schemas.microsoft.com/office/powerpoint/2012/main" timeZoneBias="0"/>
@@ -200,9 +203,9 @@
 
 <file path=ppt/comments/comment4.xml><?xml version="1.0" encoding="utf-8"?>
 <p:cmLst xmlns:a="http://schemas.openxmlformats.org/drawingml/2006/main" xmlns:r="http://schemas.openxmlformats.org/officeDocument/2006/relationships" xmlns:p="http://schemas.openxmlformats.org/presentationml/2006/main">
-  <p:cm authorId="1" dt="2019-10-29T16:07:06.528" idx="16">
+  <p:cm authorId="1" dt="2019-11-11T14:39:07.142" idx="28">
     <p:pos x="10" y="10"/>
-    <p:text/>
+    <p:text>My game is targetted towards the AAA consoles and Games PC's due to the grafical demands and gameplay. Target Age is 16+ who are into tactical, exploring and  competition.</p:text>
     <p:extLst>
       <p:ext uri="{C676402C-5697-4E1C-873F-D02D1690AC5C}">
         <p15:threadingInfo xmlns:p15="http://schemas.microsoft.com/office/powerpoint/2012/main" timeZoneBias="0"/>
@@ -228,9 +231,9 @@
 
 <file path=ppt/comments/comment6.xml><?xml version="1.0" encoding="utf-8"?>
 <p:cmLst xmlns:a="http://schemas.openxmlformats.org/drawingml/2006/main" xmlns:r="http://schemas.openxmlformats.org/officeDocument/2006/relationships" xmlns:p="http://schemas.openxmlformats.org/presentationml/2006/main">
-  <p:cm authorId="1" dt="2019-11-11T16:53:44.291" idx="29">
+  <p:cm authorId="1" dt="2019-11-07T16:37:07.952" idx="25">
     <p:pos x="10" y="10"/>
-    <p:text>Players will be encouraged to try and complete harder levels by giving them the oppotunity to get bettr weapons/ armour/ currency. Both slow strategic and fast shoot them up strategies are encouraged to be used depending on the players gameplay. Players are given the oppotunity to get help for free after multiple deaths at a certain point of the level.</p:text>
+    <p:text>the players when starting the game will at the heart of washington (white house) to witness the scenes of destruction and after discovering theyre playing as trump they want to known what happened and what they did to cause this civil war.</p:text>
     <p:extLst>
       <p:ext uri="{C676402C-5697-4E1C-873F-D02D1690AC5C}">
         <p15:threadingInfo xmlns:p15="http://schemas.microsoft.com/office/powerpoint/2012/main" timeZoneBias="0"/>
@@ -242,9 +245,9 @@
 
 <file path=ppt/comments/comment7.xml><?xml version="1.0" encoding="utf-8"?>
 <p:cmLst xmlns:a="http://schemas.openxmlformats.org/drawingml/2006/main" xmlns:r="http://schemas.openxmlformats.org/officeDocument/2006/relationships" xmlns:p="http://schemas.openxmlformats.org/presentationml/2006/main">
-  <p:cm authorId="1" dt="2019-11-07T16:14:38.531" idx="24">
+  <p:cm authorId="1" dt="2019-10-29T16:07:06.528" idx="16">
     <p:pos x="10" y="10"/>
-    <p:text>All major cities and each state is represented with an 3d iconic building/ landmark in the pause menu map view. Certain audio will be used in situations the players encounter such as enemies, intel locations and allies.</p:text>
+    <p:text/>
     <p:extLst>
       <p:ext uri="{C676402C-5697-4E1C-873F-D02D1690AC5C}">
         <p15:threadingInfo xmlns:p15="http://schemas.microsoft.com/office/powerpoint/2012/main" timeZoneBias="0"/>
@@ -256,9 +259,9 @@
 
 <file path=ppt/comments/comment8.xml><?xml version="1.0" encoding="utf-8"?>
 <p:cmLst xmlns:a="http://schemas.openxmlformats.org/drawingml/2006/main" xmlns:r="http://schemas.openxmlformats.org/officeDocument/2006/relationships" xmlns:p="http://schemas.openxmlformats.org/presentationml/2006/main">
-  <p:cm authorId="1" dt="2019-11-07T16:37:07.952" idx="25">
+  <p:cm authorId="1" dt="2019-11-07T16:14:38.531" idx="24">
     <p:pos x="10" y="10"/>
-    <p:text>the players when starting the game will at the heart of washington (white house) to witness the scenes of destruction and after discovering theyre playing as trump they want to known what happened and what they did to cause this civil war.</p:text>
+    <p:text>All major cities and each state is represented with an 3d iconic building/ landmark in the pause menu map view. Certain audio will be used in situations the players encounter such as enemies, intel locations and allies.</p:text>
     <p:extLst>
       <p:ext uri="{C676402C-5697-4E1C-873F-D02D1690AC5C}">
         <p15:threadingInfo xmlns:p15="http://schemas.microsoft.com/office/powerpoint/2012/main" timeZoneBias="0"/>
@@ -473,7 +476,7 @@
           <a:p>
             <a:fld id="{69961751-09E4-4FFE-84B7-667AD67FB8C5}" type="datetimeFigureOut">
               <a:rPr lang="en-GB" smtClean="0"/>
-              <a:t>27/11/2019</a:t>
+              <a:t>12/12/2019</a:t>
             </a:fld>
             <a:endParaRPr lang="en-GB"/>
           </a:p>
@@ -909,7 +912,7 @@
           <a:p>
             <a:fld id="{69961751-09E4-4FFE-84B7-667AD67FB8C5}" type="datetimeFigureOut">
               <a:rPr lang="en-GB" smtClean="0"/>
-              <a:t>27/11/2019</a:t>
+              <a:t>12/12/2019</a:t>
             </a:fld>
             <a:endParaRPr lang="en-GB"/>
           </a:p>
@@ -1159,7 +1162,7 @@
           <a:p>
             <a:fld id="{69961751-09E4-4FFE-84B7-667AD67FB8C5}" type="datetimeFigureOut">
               <a:rPr lang="en-GB" smtClean="0"/>
-              <a:t>27/11/2019</a:t>
+              <a:t>12/12/2019</a:t>
             </a:fld>
             <a:endParaRPr lang="en-GB"/>
           </a:p>
@@ -1467,7 +1470,7 @@
           <a:p>
             <a:fld id="{69961751-09E4-4FFE-84B7-667AD67FB8C5}" type="datetimeFigureOut">
               <a:rPr lang="en-GB" smtClean="0"/>
-              <a:t>27/11/2019</a:t>
+              <a:t>12/12/2019</a:t>
             </a:fld>
             <a:endParaRPr lang="en-GB"/>
           </a:p>
@@ -1785,7 +1788,7 @@
           <a:p>
             <a:fld id="{69961751-09E4-4FFE-84B7-667AD67FB8C5}" type="datetimeFigureOut">
               <a:rPr lang="en-GB" smtClean="0"/>
-              <a:t>27/11/2019</a:t>
+              <a:t>12/12/2019</a:t>
             </a:fld>
             <a:endParaRPr lang="en-GB"/>
           </a:p>
@@ -2087,7 +2090,7 @@
           <a:p>
             <a:fld id="{69961751-09E4-4FFE-84B7-667AD67FB8C5}" type="datetimeFigureOut">
               <a:rPr lang="en-GB" smtClean="0"/>
-              <a:t>27/11/2019</a:t>
+              <a:t>12/12/2019</a:t>
             </a:fld>
             <a:endParaRPr lang="en-GB"/>
           </a:p>
@@ -2454,7 +2457,7 @@
           <a:p>
             <a:fld id="{69961751-09E4-4FFE-84B7-667AD67FB8C5}" type="datetimeFigureOut">
               <a:rPr lang="en-GB" smtClean="0"/>
-              <a:t>27/11/2019</a:t>
+              <a:t>12/12/2019</a:t>
             </a:fld>
             <a:endParaRPr lang="en-GB"/>
           </a:p>
@@ -2628,7 +2631,7 @@
           <a:p>
             <a:fld id="{69961751-09E4-4FFE-84B7-667AD67FB8C5}" type="datetimeFigureOut">
               <a:rPr lang="en-GB" smtClean="0"/>
-              <a:t>27/11/2019</a:t>
+              <a:t>12/12/2019</a:t>
             </a:fld>
             <a:endParaRPr lang="en-GB"/>
           </a:p>
@@ -2808,7 +2811,7 @@
           <a:p>
             <a:fld id="{69961751-09E4-4FFE-84B7-667AD67FB8C5}" type="datetimeFigureOut">
               <a:rPr lang="en-GB" smtClean="0"/>
-              <a:t>27/11/2019</a:t>
+              <a:t>12/12/2019</a:t>
             </a:fld>
             <a:endParaRPr lang="en-GB"/>
           </a:p>
@@ -2978,7 +2981,7 @@
           <a:p>
             <a:fld id="{69961751-09E4-4FFE-84B7-667AD67FB8C5}" type="datetimeFigureOut">
               <a:rPr lang="en-GB" smtClean="0"/>
-              <a:t>27/11/2019</a:t>
+              <a:t>12/12/2019</a:t>
             </a:fld>
             <a:endParaRPr lang="en-GB"/>
           </a:p>
@@ -3228,7 +3231,7 @@
           <a:p>
             <a:fld id="{69961751-09E4-4FFE-84B7-667AD67FB8C5}" type="datetimeFigureOut">
               <a:rPr lang="en-GB" smtClean="0"/>
-              <a:t>27/11/2019</a:t>
+              <a:t>12/12/2019</a:t>
             </a:fld>
             <a:endParaRPr lang="en-GB"/>
           </a:p>
@@ -3464,7 +3467,7 @@
           <a:p>
             <a:fld id="{69961751-09E4-4FFE-84B7-667AD67FB8C5}" type="datetimeFigureOut">
               <a:rPr lang="en-GB" smtClean="0"/>
-              <a:t>27/11/2019</a:t>
+              <a:t>12/12/2019</a:t>
             </a:fld>
             <a:endParaRPr lang="en-GB"/>
           </a:p>
@@ -3846,7 +3849,7 @@
           <a:p>
             <a:fld id="{69961751-09E4-4FFE-84B7-667AD67FB8C5}" type="datetimeFigureOut">
               <a:rPr lang="en-GB" smtClean="0"/>
-              <a:t>27/11/2019</a:t>
+              <a:t>12/12/2019</a:t>
             </a:fld>
             <a:endParaRPr lang="en-GB"/>
           </a:p>
@@ -3964,7 +3967,7 @@
           <a:p>
             <a:fld id="{69961751-09E4-4FFE-84B7-667AD67FB8C5}" type="datetimeFigureOut">
               <a:rPr lang="en-GB" smtClean="0"/>
-              <a:t>27/11/2019</a:t>
+              <a:t>12/12/2019</a:t>
             </a:fld>
             <a:endParaRPr lang="en-GB"/>
           </a:p>
@@ -4059,7 +4062,7 @@
           <a:p>
             <a:fld id="{69961751-09E4-4FFE-84B7-667AD67FB8C5}" type="datetimeFigureOut">
               <a:rPr lang="en-GB" smtClean="0"/>
-              <a:t>27/11/2019</a:t>
+              <a:t>12/12/2019</a:t>
             </a:fld>
             <a:endParaRPr lang="en-GB"/>
           </a:p>
@@ -4314,7 +4317,7 @@
           <a:p>
             <a:fld id="{69961751-09E4-4FFE-84B7-667AD67FB8C5}" type="datetimeFigureOut">
               <a:rPr lang="en-GB" smtClean="0"/>
-              <a:t>27/11/2019</a:t>
+              <a:t>12/12/2019</a:t>
             </a:fld>
             <a:endParaRPr lang="en-GB"/>
           </a:p>
@@ -4597,7 +4600,7 @@
           <a:p>
             <a:fld id="{69961751-09E4-4FFE-84B7-667AD67FB8C5}" type="datetimeFigureOut">
               <a:rPr lang="en-GB" smtClean="0"/>
-              <a:t>27/11/2019</a:t>
+              <a:t>12/12/2019</a:t>
             </a:fld>
             <a:endParaRPr lang="en-GB"/>
           </a:p>
@@ -5003,7 +5006,7 @@
           <a:p>
             <a:fld id="{69961751-09E4-4FFE-84B7-667AD67FB8C5}" type="datetimeFigureOut">
               <a:rPr lang="en-GB" smtClean="0"/>
-              <a:t>27/11/2019</a:t>
+              <a:t>12/12/2019</a:t>
             </a:fld>
             <a:endParaRPr lang="en-GB"/>
           </a:p>
@@ -5674,6 +5677,381 @@
             <p:ph type="title"/>
           </p:nvPr>
         </p:nvSpPr>
+        <p:spPr/>
+        <p:txBody>
+          <a:bodyPr/>
+          <a:lstStyle/>
+          <a:p>
+            <a:r>
+              <a:rPr lang="en-GB" dirty="0" smtClean="0"/>
+              <a:t>Characters Story Arks</a:t>
+            </a:r>
+            <a:endParaRPr lang="en-GB" dirty="0"/>
+          </a:p>
+        </p:txBody>
+      </p:sp>
+      <p:sp>
+        <p:nvSpPr>
+          <p:cNvPr id="3" name="Content Placeholder 2"/>
+          <p:cNvSpPr>
+            <a:spLocks noGrp="1"/>
+          </p:cNvSpPr>
+          <p:nvPr>
+            <p:ph idx="1"/>
+          </p:nvPr>
+        </p:nvSpPr>
+        <p:spPr/>
+        <p:txBody>
+          <a:bodyPr/>
+          <a:lstStyle/>
+          <a:p>
+            <a:endParaRPr lang="en-GB"/>
+          </a:p>
+        </p:txBody>
+      </p:sp>
+    </p:spTree>
+    <p:extLst>
+      <p:ext uri="{BB962C8B-B14F-4D97-AF65-F5344CB8AC3E}">
+        <p14:creationId xmlns:p14="http://schemas.microsoft.com/office/powerpoint/2010/main" val="3657195491"/>
+      </p:ext>
+    </p:extLst>
+  </p:cSld>
+  <p:clrMapOvr>
+    <a:masterClrMapping/>
+  </p:clrMapOvr>
+</p:sld>
+</file>
+
+<file path=ppt/slides/slide11.xml><?xml version="1.0" encoding="utf-8"?>
+<p:sld xmlns:a="http://schemas.openxmlformats.org/drawingml/2006/main" xmlns:r="http://schemas.openxmlformats.org/officeDocument/2006/relationships" xmlns:p="http://schemas.openxmlformats.org/presentationml/2006/main">
+  <p:cSld>
+    <p:spTree>
+      <p:nvGrpSpPr>
+        <p:cNvPr id="1" name=""/>
+        <p:cNvGrpSpPr/>
+        <p:nvPr/>
+      </p:nvGrpSpPr>
+      <p:grpSpPr>
+        <a:xfrm>
+          <a:off x="0" y="0"/>
+          <a:ext cx="0" cy="0"/>
+          <a:chOff x="0" y="0"/>
+          <a:chExt cx="0" cy="0"/>
+        </a:xfrm>
+      </p:grpSpPr>
+      <p:sp>
+        <p:nvSpPr>
+          <p:cNvPr id="2" name="Title 1"/>
+          <p:cNvSpPr>
+            <a:spLocks noGrp="1"/>
+          </p:cNvSpPr>
+          <p:nvPr>
+            <p:ph type="title"/>
+          </p:nvPr>
+        </p:nvSpPr>
+        <p:spPr>
+          <a:xfrm>
+            <a:off x="825529" y="578618"/>
+            <a:ext cx="8534400" cy="1507067"/>
+          </a:xfrm>
+        </p:spPr>
+        <p:txBody>
+          <a:bodyPr/>
+          <a:lstStyle/>
+          <a:p>
+            <a:r>
+              <a:rPr lang="en-GB" dirty="0" smtClean="0">
+                <a:latin typeface="Arial" panose="020B0604020202020204" pitchFamily="34" charset="0"/>
+                <a:cs typeface="Arial" panose="020B0604020202020204" pitchFamily="34" charset="0"/>
+              </a:rPr>
+              <a:t>World/Locations</a:t>
+            </a:r>
+            <a:endParaRPr lang="en-GB" dirty="0">
+              <a:latin typeface="Arial" panose="020B0604020202020204" pitchFamily="34" charset="0"/>
+              <a:cs typeface="Arial" panose="020B0604020202020204" pitchFamily="34" charset="0"/>
+            </a:endParaRPr>
+          </a:p>
+        </p:txBody>
+      </p:sp>
+      <p:sp>
+        <p:nvSpPr>
+          <p:cNvPr id="3" name="Content Placeholder 2"/>
+          <p:cNvSpPr>
+            <a:spLocks noGrp="1"/>
+          </p:cNvSpPr>
+          <p:nvPr>
+            <p:ph idx="1"/>
+          </p:nvPr>
+        </p:nvSpPr>
+        <p:spPr>
+          <a:xfrm>
+            <a:off x="825529" y="2223268"/>
+            <a:ext cx="8534400" cy="3615267"/>
+          </a:xfrm>
+        </p:spPr>
+        <p:txBody>
+          <a:bodyPr/>
+          <a:lstStyle/>
+          <a:p>
+            <a:r>
+              <a:rPr lang="en-GB" dirty="0" smtClean="0">
+                <a:latin typeface="Times New Roman" panose="02020603050405020304" pitchFamily="18" charset="0"/>
+                <a:cs typeface="Times New Roman" panose="02020603050405020304" pitchFamily="18" charset="0"/>
+              </a:rPr>
+              <a:t>Iconic Buildings/ structures (Mexican wall) represented</a:t>
+            </a:r>
+          </a:p>
+          <a:p>
+            <a:r>
+              <a:rPr lang="en-GB" dirty="0" smtClean="0">
+                <a:latin typeface="Times New Roman" panose="02020603050405020304" pitchFamily="18" charset="0"/>
+                <a:cs typeface="Times New Roman" panose="02020603050405020304" pitchFamily="18" charset="0"/>
+              </a:rPr>
+              <a:t>Cities and states provide difficulty level and rewards</a:t>
+            </a:r>
+          </a:p>
+          <a:p>
+            <a:r>
+              <a:rPr lang="en-GB" dirty="0" smtClean="0">
+                <a:latin typeface="Times New Roman" panose="02020603050405020304" pitchFamily="18" charset="0"/>
+                <a:cs typeface="Times New Roman" panose="02020603050405020304" pitchFamily="18" charset="0"/>
+              </a:rPr>
+              <a:t>Map of America</a:t>
+            </a:r>
+          </a:p>
+          <a:p>
+            <a:r>
+              <a:rPr lang="en-GB" dirty="0" smtClean="0">
+                <a:latin typeface="Times New Roman" panose="02020603050405020304" pitchFamily="18" charset="0"/>
+                <a:cs typeface="Times New Roman" panose="02020603050405020304" pitchFamily="18" charset="0"/>
+              </a:rPr>
+              <a:t>Audio included in different scenarios </a:t>
+            </a:r>
+          </a:p>
+          <a:p>
+            <a:r>
+              <a:rPr lang="en-GB" dirty="0" smtClean="0">
+                <a:latin typeface="Times New Roman" panose="02020603050405020304" pitchFamily="18" charset="0"/>
+                <a:cs typeface="Times New Roman" panose="02020603050405020304" pitchFamily="18" charset="0"/>
+              </a:rPr>
+              <a:t>Find intel of real world articles/ news stories</a:t>
+            </a:r>
+          </a:p>
+          <a:p>
+            <a:endParaRPr lang="en-GB" dirty="0" smtClean="0"/>
+          </a:p>
+          <a:p>
+            <a:endParaRPr lang="en-GB" dirty="0" smtClean="0"/>
+          </a:p>
+          <a:p>
+            <a:endParaRPr lang="en-GB" dirty="0"/>
+          </a:p>
+        </p:txBody>
+      </p:sp>
+      <p:pic>
+        <p:nvPicPr>
+          <p:cNvPr id="4" name="Picture 3"/>
+          <p:cNvPicPr>
+            <a:picLocks noChangeAspect="1"/>
+          </p:cNvPicPr>
+          <p:nvPr/>
+        </p:nvPicPr>
+        <p:blipFill rotWithShape="1">
+          <a:blip r:embed="rId2">
+            <a:extLst>
+              <a:ext uri="{28A0092B-C50C-407E-A947-70E740481C1C}">
+                <a14:useLocalDpi xmlns:a14="http://schemas.microsoft.com/office/drawing/2010/main" val="0"/>
+              </a:ext>
+            </a:extLst>
+          </a:blip>
+          <a:srcRect l="9314" r="11070"/>
+          <a:stretch/>
+        </p:blipFill>
+        <p:spPr>
+          <a:xfrm>
+            <a:off x="6934200" y="1079942"/>
+            <a:ext cx="2849880" cy="2011486"/>
+          </a:xfrm>
+          <a:prstGeom prst="rect">
+            <a:avLst/>
+          </a:prstGeom>
+        </p:spPr>
+      </p:pic>
+      <p:pic>
+        <p:nvPicPr>
+          <p:cNvPr id="6" name="Picture 5"/>
+          <p:cNvPicPr>
+            <a:picLocks noChangeAspect="1"/>
+          </p:cNvPicPr>
+          <p:nvPr/>
+        </p:nvPicPr>
+        <p:blipFill>
+          <a:blip r:embed="rId3" cstate="print">
+            <a:extLst>
+              <a:ext uri="{28A0092B-C50C-407E-A947-70E740481C1C}">
+                <a14:useLocalDpi xmlns:a14="http://schemas.microsoft.com/office/drawing/2010/main" val="0"/>
+              </a:ext>
+            </a:extLst>
+          </a:blip>
+          <a:stretch>
+            <a:fillRect/>
+          </a:stretch>
+        </p:blipFill>
+        <p:spPr>
+          <a:xfrm>
+            <a:off x="9921240" y="485485"/>
+            <a:ext cx="2133600" cy="3200400"/>
+          </a:xfrm>
+          <a:prstGeom prst="rect">
+            <a:avLst/>
+          </a:prstGeom>
+        </p:spPr>
+      </p:pic>
+      <p:pic>
+        <p:nvPicPr>
+          <p:cNvPr id="7" name="Picture 6"/>
+          <p:cNvPicPr>
+            <a:picLocks noChangeAspect="1"/>
+          </p:cNvPicPr>
+          <p:nvPr/>
+        </p:nvPicPr>
+        <p:blipFill rotWithShape="1">
+          <a:blip r:embed="rId4" cstate="print">
+            <a:extLst>
+              <a:ext uri="{28A0092B-C50C-407E-A947-70E740481C1C}">
+                <a14:useLocalDpi xmlns:a14="http://schemas.microsoft.com/office/drawing/2010/main" val="0"/>
+              </a:ext>
+            </a:extLst>
+          </a:blip>
+          <a:srcRect l="21073" t="6299" r="22067"/>
+          <a:stretch/>
+        </p:blipFill>
+        <p:spPr>
+          <a:xfrm>
+            <a:off x="9898380" y="3840479"/>
+            <a:ext cx="2179320" cy="2394295"/>
+          </a:xfrm>
+          <a:prstGeom prst="rect">
+            <a:avLst/>
+          </a:prstGeom>
+        </p:spPr>
+      </p:pic>
+      <p:sp>
+        <p:nvSpPr>
+          <p:cNvPr id="8" name="AutoShape 4" descr="https://cdn.vox-cdn.com/thumbor/EZyqrlK4dODpKU_n-WbRlKyYEyo=/0x0:5211x3603/920x0/filters:focal(0x0:5211x3603):format(webp):no_upscale()/cdn.vox-cdn.com/uploads/chorus_asset/file/9686667/shutterstock_344648759.jpg"/>
+          <p:cNvSpPr>
+            <a:spLocks noChangeAspect="1" noChangeArrowheads="1"/>
+          </p:cNvSpPr>
+          <p:nvPr/>
+        </p:nvSpPr>
+        <p:spPr bwMode="auto">
+          <a:xfrm>
+            <a:off x="1922780" y="2085685"/>
+            <a:ext cx="7048500" cy="4876800"/>
+          </a:xfrm>
+          <a:prstGeom prst="rect">
+            <a:avLst/>
+          </a:prstGeom>
+          <a:noFill/>
+          <a:extLst>
+            <a:ext uri="{909E8E84-426E-40DD-AFC4-6F175D3DCCD1}">
+              <a14:hiddenFill xmlns:a14="http://schemas.microsoft.com/office/drawing/2010/main">
+                <a:solidFill>
+                  <a:srgbClr val="FFFFFF"/>
+                </a:solidFill>
+              </a14:hiddenFill>
+            </a:ext>
+          </a:extLst>
+        </p:spPr>
+        <p:txBody>
+          <a:bodyPr vert="horz" wrap="square" lIns="91440" tIns="45720" rIns="91440" bIns="45720" numCol="1" anchor="t" anchorCtr="0" compatLnSpc="1">
+            <a:prstTxWarp prst="textNoShape">
+              <a:avLst/>
+            </a:prstTxWarp>
+          </a:bodyPr>
+          <a:lstStyle/>
+          <a:p>
+            <a:endParaRPr lang="en-GB"/>
+          </a:p>
+        </p:txBody>
+      </p:sp>
+      <p:pic>
+        <p:nvPicPr>
+          <p:cNvPr id="9" name="Picture 8"/>
+          <p:cNvPicPr>
+            <a:picLocks noChangeAspect="1"/>
+          </p:cNvPicPr>
+          <p:nvPr/>
+        </p:nvPicPr>
+        <p:blipFill>
+          <a:blip r:embed="rId5" cstate="print">
+            <a:extLst>
+              <a:ext uri="{28A0092B-C50C-407E-A947-70E740481C1C}">
+                <a14:useLocalDpi xmlns:a14="http://schemas.microsoft.com/office/drawing/2010/main" val="0"/>
+              </a:ext>
+            </a:extLst>
+          </a:blip>
+          <a:stretch>
+            <a:fillRect/>
+          </a:stretch>
+        </p:blipFill>
+        <p:spPr>
+          <a:xfrm>
+            <a:off x="6605241" y="3229011"/>
+            <a:ext cx="3178839" cy="2197919"/>
+          </a:xfrm>
+          <a:prstGeom prst="rect">
+            <a:avLst/>
+          </a:prstGeom>
+        </p:spPr>
+      </p:pic>
+    </p:spTree>
+    <p:extLst>
+      <p:ext uri="{BB962C8B-B14F-4D97-AF65-F5344CB8AC3E}">
+        <p14:creationId xmlns:p14="http://schemas.microsoft.com/office/powerpoint/2010/main" val="456655861"/>
+      </p:ext>
+    </p:extLst>
+  </p:cSld>
+  <p:clrMapOvr>
+    <a:masterClrMapping/>
+  </p:clrMapOvr>
+  <p:timing>
+    <p:tnLst>
+      <p:par>
+        <p:cTn id="1" dur="indefinite" restart="never" nodeType="tmRoot"/>
+      </p:par>
+    </p:tnLst>
+  </p:timing>
+</p:sld>
+</file>
+
+<file path=ppt/slides/slide12.xml><?xml version="1.0" encoding="utf-8"?>
+<p:sld xmlns:a="http://schemas.openxmlformats.org/drawingml/2006/main" xmlns:r="http://schemas.openxmlformats.org/officeDocument/2006/relationships" xmlns:p="http://schemas.openxmlformats.org/presentationml/2006/main">
+  <p:cSld>
+    <p:spTree>
+      <p:nvGrpSpPr>
+        <p:cNvPr id="1" name=""/>
+        <p:cNvGrpSpPr/>
+        <p:nvPr/>
+      </p:nvGrpSpPr>
+      <p:grpSpPr>
+        <a:xfrm>
+          <a:off x="0" y="0"/>
+          <a:ext cx="0" cy="0"/>
+          <a:chOff x="0" y="0"/>
+          <a:chExt cx="0" cy="0"/>
+        </a:xfrm>
+      </p:grpSpPr>
+      <p:sp>
+        <p:nvSpPr>
+          <p:cNvPr id="2" name="Title 1"/>
+          <p:cNvSpPr>
+            <a:spLocks noGrp="1"/>
+          </p:cNvSpPr>
+          <p:nvPr>
+            <p:ph type="title"/>
+          </p:nvPr>
+        </p:nvSpPr>
         <p:spPr>
           <a:xfrm>
             <a:off x="825529" y="788168"/>
@@ -5779,7 +6157,7 @@
 </p:sld>
 </file>
 
-<file path=ppt/slides/slide11.xml><?xml version="1.0" encoding="utf-8"?>
+<file path=ppt/slides/slide13.xml><?xml version="1.0" encoding="utf-8"?>
 <p:sld xmlns:a="http://schemas.openxmlformats.org/drawingml/2006/main" xmlns:r="http://schemas.openxmlformats.org/officeDocument/2006/relationships" xmlns:p="http://schemas.openxmlformats.org/presentationml/2006/main">
   <p:cSld>
     <p:spTree>
@@ -5842,7 +6220,7 @@
         </p:nvSpPr>
         <p:spPr>
           <a:xfrm>
-            <a:off x="825529" y="1381603"/>
+            <a:off x="825529" y="1912944"/>
             <a:ext cx="8534400" cy="3615267"/>
           </a:xfrm>
         </p:spPr>
@@ -5884,6 +6262,23 @@
               </a:rPr>
               <a:t>Loyalists/ Trump enthusiasts </a:t>
             </a:r>
+            <a:endParaRPr lang="en-GB" dirty="0" smtClean="0">
+              <a:latin typeface="Times New Roman" panose="02020603050405020304" pitchFamily="18" charset="0"/>
+              <a:cs typeface="Times New Roman" panose="02020603050405020304" pitchFamily="18" charset="0"/>
+            </a:endParaRPr>
+          </a:p>
+          <a:p>
+            <a:r>
+              <a:rPr lang="en-GB" dirty="0" smtClean="0">
+                <a:latin typeface="Times New Roman" panose="02020603050405020304" pitchFamily="18" charset="0"/>
+                <a:cs typeface="Times New Roman" panose="02020603050405020304" pitchFamily="18" charset="0"/>
+              </a:rPr>
+              <a:t>Seasonal Customisations</a:t>
+            </a:r>
+            <a:endParaRPr lang="en-GB" dirty="0" smtClean="0">
+              <a:latin typeface="Times New Roman" panose="02020603050405020304" pitchFamily="18" charset="0"/>
+              <a:cs typeface="Times New Roman" panose="02020603050405020304" pitchFamily="18" charset="0"/>
+            </a:endParaRPr>
           </a:p>
           <a:p>
             <a:endParaRPr lang="en-GB" dirty="0"/>
@@ -5910,7 +6305,79 @@
 </p:sld>
 </file>
 
-<file path=ppt/slides/slide12.xml><?xml version="1.0" encoding="utf-8"?>
+<file path=ppt/slides/slide14.xml><?xml version="1.0" encoding="utf-8"?>
+<p:sld xmlns:a="http://schemas.openxmlformats.org/drawingml/2006/main" xmlns:r="http://schemas.openxmlformats.org/officeDocument/2006/relationships" xmlns:p="http://schemas.openxmlformats.org/presentationml/2006/main">
+  <p:cSld>
+    <p:spTree>
+      <p:nvGrpSpPr>
+        <p:cNvPr id="1" name=""/>
+        <p:cNvGrpSpPr/>
+        <p:nvPr/>
+      </p:nvGrpSpPr>
+      <p:grpSpPr>
+        <a:xfrm>
+          <a:off x="0" y="0"/>
+          <a:ext cx="0" cy="0"/>
+          <a:chOff x="0" y="0"/>
+          <a:chExt cx="0" cy="0"/>
+        </a:xfrm>
+      </p:grpSpPr>
+      <p:sp>
+        <p:nvSpPr>
+          <p:cNvPr id="2" name="Title 1"/>
+          <p:cNvSpPr>
+            <a:spLocks noGrp="1"/>
+          </p:cNvSpPr>
+          <p:nvPr>
+            <p:ph type="title"/>
+          </p:nvPr>
+        </p:nvSpPr>
+        <p:spPr/>
+        <p:txBody>
+          <a:bodyPr/>
+          <a:lstStyle/>
+          <a:p>
+            <a:r>
+              <a:rPr lang="en-GB" dirty="0" smtClean="0"/>
+              <a:t>Potential DLC’s</a:t>
+            </a:r>
+            <a:endParaRPr lang="en-GB" dirty="0"/>
+          </a:p>
+        </p:txBody>
+      </p:sp>
+      <p:sp>
+        <p:nvSpPr>
+          <p:cNvPr id="3" name="Content Placeholder 2"/>
+          <p:cNvSpPr>
+            <a:spLocks noGrp="1"/>
+          </p:cNvSpPr>
+          <p:nvPr>
+            <p:ph idx="1"/>
+          </p:nvPr>
+        </p:nvSpPr>
+        <p:spPr/>
+        <p:txBody>
+          <a:bodyPr/>
+          <a:lstStyle/>
+          <a:p>
+            <a:endParaRPr lang="en-GB"/>
+          </a:p>
+        </p:txBody>
+      </p:sp>
+    </p:spTree>
+    <p:extLst>
+      <p:ext uri="{BB962C8B-B14F-4D97-AF65-F5344CB8AC3E}">
+        <p14:creationId xmlns:p14="http://schemas.microsoft.com/office/powerpoint/2010/main" val="3754362323"/>
+      </p:ext>
+    </p:extLst>
+  </p:cSld>
+  <p:clrMapOvr>
+    <a:masterClrMapping/>
+  </p:clrMapOvr>
+</p:sld>
+</file>
+
+<file path=ppt/slides/slide15.xml><?xml version="1.0" encoding="utf-8"?>
 <p:sld xmlns:a="http://schemas.openxmlformats.org/drawingml/2006/main" xmlns:r="http://schemas.openxmlformats.org/officeDocument/2006/relationships" xmlns:p="http://schemas.openxmlformats.org/presentationml/2006/main">
   <p:cSld>
     <p:spTree>
@@ -6046,89 +6513,102 @@
           <a:bodyPr/>
           <a:lstStyle/>
           <a:p>
+            <a:endParaRPr lang="en-GB" dirty="0" smtClean="0">
+              <a:latin typeface="Times New Roman" panose="02020603050405020304" pitchFamily="18" charset="0"/>
+              <a:cs typeface="Times New Roman" panose="02020603050405020304" pitchFamily="18" charset="0"/>
+            </a:endParaRPr>
+          </a:p>
+          <a:p>
+            <a:endParaRPr lang="en-GB" dirty="0" smtClean="0">
+              <a:latin typeface="Times New Roman" panose="02020603050405020304" pitchFamily="18" charset="0"/>
+              <a:cs typeface="Times New Roman" panose="02020603050405020304" pitchFamily="18" charset="0"/>
+            </a:endParaRPr>
+          </a:p>
+          <a:p>
+            <a:endParaRPr lang="en-GB" dirty="0">
+              <a:latin typeface="Times New Roman" panose="02020603050405020304" pitchFamily="18" charset="0"/>
+              <a:cs typeface="Times New Roman" panose="02020603050405020304" pitchFamily="18" charset="0"/>
+            </a:endParaRPr>
+          </a:p>
+          <a:p>
+            <a:r>
+              <a:rPr lang="en-GB" dirty="0" smtClean="0">
+                <a:latin typeface="Times New Roman" panose="02020603050405020304" pitchFamily="18" charset="0"/>
+                <a:cs typeface="Times New Roman" panose="02020603050405020304" pitchFamily="18" charset="0"/>
+              </a:rPr>
+              <a:t>Very recognisable characters</a:t>
+            </a:r>
+          </a:p>
+          <a:p>
             <a:r>
               <a:rPr lang="en-GB" dirty="0">
                 <a:latin typeface="Times New Roman" panose="02020603050405020304" pitchFamily="18" charset="0"/>
                 <a:cs typeface="Times New Roman" panose="02020603050405020304" pitchFamily="18" charset="0"/>
               </a:rPr>
-              <a:t>Intended game systems</a:t>
+              <a:t>A</a:t>
             </a:r>
             <a:r>
               <a:rPr lang="en-GB" dirty="0" smtClean="0">
                 <a:latin typeface="Times New Roman" panose="02020603050405020304" pitchFamily="18" charset="0"/>
                 <a:cs typeface="Times New Roman" panose="02020603050405020304" pitchFamily="18" charset="0"/>
               </a:rPr>
-              <a:t>: AAA Consoles/ Games PC’s</a:t>
-            </a:r>
-            <a:endParaRPr lang="en-GB" dirty="0">
-              <a:latin typeface="Times New Roman" panose="02020603050405020304" pitchFamily="18" charset="0"/>
-              <a:cs typeface="Times New Roman" panose="02020603050405020304" pitchFamily="18" charset="0"/>
-            </a:endParaRPr>
-          </a:p>
-          <a:p>
-            <a:r>
-              <a:rPr lang="en-GB" dirty="0">
-                <a:latin typeface="Times New Roman" panose="02020603050405020304" pitchFamily="18" charset="0"/>
-                <a:cs typeface="Times New Roman" panose="02020603050405020304" pitchFamily="18" charset="0"/>
-              </a:rPr>
-              <a:t>Target age of players</a:t>
-            </a:r>
+              <a:t>ll the Playable characters in Logo</a:t>
+            </a:r>
+          </a:p>
+          <a:p>
             <a:r>
               <a:rPr lang="en-GB" dirty="0" smtClean="0">
                 <a:latin typeface="Times New Roman" panose="02020603050405020304" pitchFamily="18" charset="0"/>
                 <a:cs typeface="Times New Roman" panose="02020603050405020304" pitchFamily="18" charset="0"/>
               </a:rPr>
-              <a:t>: 16+ (Tactical, Exploring &amp; Competition)</a:t>
-            </a:r>
-            <a:endParaRPr lang="en-GB" dirty="0">
-              <a:latin typeface="Times New Roman" panose="02020603050405020304" pitchFamily="18" charset="0"/>
-              <a:cs typeface="Times New Roman" panose="02020603050405020304" pitchFamily="18" charset="0"/>
-            </a:endParaRPr>
-          </a:p>
-          <a:p>
-            <a:r>
-              <a:rPr lang="en-GB" dirty="0">
-                <a:latin typeface="Times New Roman" panose="02020603050405020304" pitchFamily="18" charset="0"/>
-                <a:cs typeface="Times New Roman" panose="02020603050405020304" pitchFamily="18" charset="0"/>
-              </a:rPr>
-              <a:t>PEGI/ ESRB rating</a:t>
-            </a:r>
+              <a:t>Not been a Trump game of this genre </a:t>
+            </a:r>
+          </a:p>
+          <a:p>
             <a:r>
               <a:rPr lang="en-GB" dirty="0" smtClean="0">
                 <a:latin typeface="Times New Roman" panose="02020603050405020304" pitchFamily="18" charset="0"/>
                 <a:cs typeface="Times New Roman" panose="02020603050405020304" pitchFamily="18" charset="0"/>
               </a:rPr>
-              <a:t>: 16</a:t>
-            </a:r>
-            <a:endParaRPr lang="en-GB" dirty="0">
+              <a:t>Development of the Logo</a:t>
+            </a:r>
+          </a:p>
+          <a:p>
+            <a:endParaRPr lang="en-GB" dirty="0" smtClean="0">
               <a:latin typeface="Times New Roman" panose="02020603050405020304" pitchFamily="18" charset="0"/>
               <a:cs typeface="Times New Roman" panose="02020603050405020304" pitchFamily="18" charset="0"/>
             </a:endParaRPr>
           </a:p>
           <a:p>
-            <a:r>
-              <a:rPr lang="en-GB" dirty="0">
-                <a:latin typeface="Times New Roman" panose="02020603050405020304" pitchFamily="18" charset="0"/>
-                <a:cs typeface="Times New Roman" panose="02020603050405020304" pitchFamily="18" charset="0"/>
-              </a:rPr>
-              <a:t>Placeholder LOGO:</a:t>
-            </a:r>
-          </a:p>
-          <a:p>
+            <a:endParaRPr lang="en-GB" dirty="0" smtClean="0">
+              <a:latin typeface="Times New Roman" panose="02020603050405020304" pitchFamily="18" charset="0"/>
+              <a:cs typeface="Times New Roman" panose="02020603050405020304" pitchFamily="18" charset="0"/>
+            </a:endParaRPr>
+          </a:p>
+          <a:p>
+            <a:endParaRPr lang="en-GB" dirty="0" smtClean="0">
+              <a:latin typeface="Times New Roman" panose="02020603050405020304" pitchFamily="18" charset="0"/>
+              <a:cs typeface="Times New Roman" panose="02020603050405020304" pitchFamily="18" charset="0"/>
+            </a:endParaRPr>
+          </a:p>
+          <a:p>
+            <a:pPr marL="0" indent="0">
+              <a:buNone/>
+            </a:pPr>
             <a:endParaRPr lang="en-GB" dirty="0"/>
           </a:p>
         </p:txBody>
       </p:sp>
       <p:pic>
         <p:nvPicPr>
-          <p:cNvPr id="4" name="Picture 3"/>
+          <p:cNvPr id="10" name="Picture 9"/>
           <p:cNvPicPr>
             <a:picLocks noChangeAspect="1"/>
           </p:cNvPicPr>
           <p:nvPr/>
         </p:nvPicPr>
         <p:blipFill>
-          <a:blip r:embed="rId2" cstate="print">
+          <a:blip r:embed="rId2">
             <a:extLst>
               <a:ext uri="{28A0092B-C50C-407E-A947-70E740481C1C}">
                 <a14:useLocalDpi xmlns:a14="http://schemas.microsoft.com/office/drawing/2010/main" val="0"/>
@@ -6141,158 +6621,8 @@
         </p:blipFill>
         <p:spPr>
           <a:xfrm>
-            <a:off x="9351616" y="621762"/>
-            <a:ext cx="1074248" cy="1310947"/>
-          </a:xfrm>
-          <a:prstGeom prst="rect">
-            <a:avLst/>
-          </a:prstGeom>
-        </p:spPr>
-      </p:pic>
-      <p:pic>
-        <p:nvPicPr>
-          <p:cNvPr id="5" name="Picture 4"/>
-          <p:cNvPicPr>
-            <a:picLocks noChangeAspect="1"/>
-          </p:cNvPicPr>
-          <p:nvPr/>
-        </p:nvPicPr>
-        <p:blipFill>
-          <a:blip r:embed="rId3" cstate="print">
-            <a:extLst>
-              <a:ext uri="{28A0092B-C50C-407E-A947-70E740481C1C}">
-                <a14:useLocalDpi xmlns:a14="http://schemas.microsoft.com/office/drawing/2010/main" val="0"/>
-              </a:ext>
-            </a:extLst>
-          </a:blip>
-          <a:stretch>
-            <a:fillRect/>
-          </a:stretch>
-        </p:blipFill>
-        <p:spPr>
-          <a:xfrm>
-            <a:off x="7997780" y="2014006"/>
-            <a:ext cx="935520" cy="935520"/>
-          </a:xfrm>
-          <a:prstGeom prst="rect">
-            <a:avLst/>
-          </a:prstGeom>
-        </p:spPr>
-      </p:pic>
-      <p:pic>
-        <p:nvPicPr>
-          <p:cNvPr id="6" name="Picture 5"/>
-          <p:cNvPicPr>
-            <a:picLocks noChangeAspect="1"/>
-          </p:cNvPicPr>
-          <p:nvPr/>
-        </p:nvPicPr>
-        <p:blipFill>
-          <a:blip r:embed="rId4" cstate="print">
-            <a:extLst>
-              <a:ext uri="{28A0092B-C50C-407E-A947-70E740481C1C}">
-                <a14:useLocalDpi xmlns:a14="http://schemas.microsoft.com/office/drawing/2010/main" val="0"/>
-              </a:ext>
-            </a:extLst>
-          </a:blip>
-          <a:stretch>
-            <a:fillRect/>
-          </a:stretch>
-        </p:blipFill>
-        <p:spPr>
-          <a:xfrm>
-            <a:off x="8933300" y="2021348"/>
-            <a:ext cx="942032" cy="942032"/>
-          </a:xfrm>
-          <a:prstGeom prst="rect">
-            <a:avLst/>
-          </a:prstGeom>
-        </p:spPr>
-      </p:pic>
-      <p:pic>
-        <p:nvPicPr>
-          <p:cNvPr id="7" name="Picture 6"/>
-          <p:cNvPicPr>
-            <a:picLocks noChangeAspect="1"/>
-          </p:cNvPicPr>
-          <p:nvPr/>
-        </p:nvPicPr>
-        <p:blipFill>
-          <a:blip r:embed="rId5" cstate="print">
-            <a:extLst>
-              <a:ext uri="{28A0092B-C50C-407E-A947-70E740481C1C}">
-                <a14:useLocalDpi xmlns:a14="http://schemas.microsoft.com/office/drawing/2010/main" val="0"/>
-              </a:ext>
-            </a:extLst>
-          </a:blip>
-          <a:stretch>
-            <a:fillRect/>
-          </a:stretch>
-        </p:blipFill>
-        <p:spPr>
-          <a:xfrm>
-            <a:off x="9868820" y="2014006"/>
-            <a:ext cx="949374" cy="949374"/>
-          </a:xfrm>
-          <a:prstGeom prst="rect">
-            <a:avLst/>
-          </a:prstGeom>
-        </p:spPr>
-      </p:pic>
-      <p:pic>
-        <p:nvPicPr>
-          <p:cNvPr id="8" name="Picture 7"/>
-          <p:cNvPicPr>
-            <a:picLocks noChangeAspect="1"/>
-          </p:cNvPicPr>
-          <p:nvPr/>
-        </p:nvPicPr>
-        <p:blipFill>
-          <a:blip r:embed="rId6" cstate="print">
-            <a:extLst>
-              <a:ext uri="{28A0092B-C50C-407E-A947-70E740481C1C}">
-                <a14:useLocalDpi xmlns:a14="http://schemas.microsoft.com/office/drawing/2010/main" val="0"/>
-              </a:ext>
-            </a:extLst>
-          </a:blip>
-          <a:stretch>
-            <a:fillRect/>
-          </a:stretch>
-        </p:blipFill>
-        <p:spPr>
-          <a:xfrm>
-            <a:off x="10810852" y="2021348"/>
-            <a:ext cx="942032" cy="942032"/>
-          </a:xfrm>
-          <a:prstGeom prst="rect">
-            <a:avLst/>
-          </a:prstGeom>
-        </p:spPr>
-      </p:pic>
-      <p:pic>
-        <p:nvPicPr>
-          <p:cNvPr id="10" name="Picture 9"/>
-          <p:cNvPicPr>
-            <a:picLocks noChangeAspect="1"/>
-          </p:cNvPicPr>
-          <p:nvPr/>
-        </p:nvPicPr>
-        <p:blipFill>
-          <a:blip r:embed="rId7">
-            <a:extLst>
-              <a:ext uri="{28A0092B-C50C-407E-A947-70E740481C1C}">
-                <a14:useLocalDpi xmlns:a14="http://schemas.microsoft.com/office/drawing/2010/main" val="0"/>
-              </a:ext>
-            </a:extLst>
-          </a:blip>
-          <a:stretch>
-            <a:fillRect/>
-          </a:stretch>
-        </p:blipFill>
-        <p:spPr>
-          <a:xfrm>
-            <a:off x="7218831" y="2868229"/>
-            <a:ext cx="4839397" cy="3539674"/>
+            <a:off x="6297993" y="1660855"/>
+            <a:ext cx="5686095" cy="4158973"/>
           </a:xfrm>
           <a:prstGeom prst="rect">
             <a:avLst/>
@@ -6407,6 +6737,19 @@
           </a:p>
           <a:p>
             <a:r>
+              <a:rPr lang="en-GB" dirty="0" smtClean="0">
+                <a:latin typeface="Times New Roman" panose="02020603050405020304" pitchFamily="18" charset="0"/>
+                <a:cs typeface="Times New Roman" panose="02020603050405020304" pitchFamily="18" charset="0"/>
+              </a:rPr>
+              <a:t>Political Civil War</a:t>
+            </a:r>
+            <a:endParaRPr lang="en-GB" dirty="0" smtClean="0">
+              <a:latin typeface="Times New Roman" panose="02020603050405020304" pitchFamily="18" charset="0"/>
+              <a:cs typeface="Times New Roman" panose="02020603050405020304" pitchFamily="18" charset="0"/>
+            </a:endParaRPr>
+          </a:p>
+          <a:p>
+            <a:r>
               <a:rPr lang="en-GB" dirty="0">
                 <a:latin typeface="Times New Roman" panose="02020603050405020304" pitchFamily="18" charset="0"/>
                 <a:cs typeface="Times New Roman" panose="02020603050405020304" pitchFamily="18" charset="0"/>
@@ -6431,24 +6774,32 @@
                 <a:latin typeface="Times New Roman" panose="02020603050405020304" pitchFamily="18" charset="0"/>
                 <a:cs typeface="Times New Roman" panose="02020603050405020304" pitchFamily="18" charset="0"/>
               </a:rPr>
-              <a:t>Trump vs rival politicians vs the people</a:t>
-            </a:r>
-          </a:p>
-          <a:p>
+              <a:t>Secret </a:t>
+            </a:r>
             <a:r>
               <a:rPr lang="en-GB" dirty="0">
                 <a:latin typeface="Times New Roman" panose="02020603050405020304" pitchFamily="18" charset="0"/>
                 <a:cs typeface="Times New Roman" panose="02020603050405020304" pitchFamily="18" charset="0"/>
               </a:rPr>
-              <a:t>The player is against the whole of </a:t>
-            </a:r>
+              <a:t>serviceman guide </a:t>
+            </a:r>
+            <a:endParaRPr lang="en-GB" dirty="0" smtClean="0">
+              <a:latin typeface="Times New Roman" panose="02020603050405020304" pitchFamily="18" charset="0"/>
+              <a:cs typeface="Times New Roman" panose="02020603050405020304" pitchFamily="18" charset="0"/>
+            </a:endParaRPr>
+          </a:p>
+          <a:p>
             <a:r>
               <a:rPr lang="en-GB" dirty="0" smtClean="0">
                 <a:latin typeface="Times New Roman" panose="02020603050405020304" pitchFamily="18" charset="0"/>
                 <a:cs typeface="Times New Roman" panose="02020603050405020304" pitchFamily="18" charset="0"/>
               </a:rPr>
-              <a:t>America</a:t>
-            </a:r>
+              <a:t>Fake Allies </a:t>
+            </a:r>
+            <a:endParaRPr lang="en-GB" dirty="0">
+              <a:latin typeface="Times New Roman" panose="02020603050405020304" pitchFamily="18" charset="0"/>
+              <a:cs typeface="Times New Roman" panose="02020603050405020304" pitchFamily="18" charset="0"/>
+            </a:endParaRPr>
           </a:p>
           <a:p>
             <a:r>
@@ -6456,41 +6807,8 @@
                 <a:latin typeface="Times New Roman" panose="02020603050405020304" pitchFamily="18" charset="0"/>
                 <a:cs typeface="Times New Roman" panose="02020603050405020304" pitchFamily="18" charset="0"/>
               </a:rPr>
-              <a:t>The players choices effect their status</a:t>
-            </a:r>
-          </a:p>
-          <a:p>
-            <a:r>
-              <a:rPr lang="en-GB" dirty="0">
-                <a:latin typeface="Times New Roman" panose="02020603050405020304" pitchFamily="18" charset="0"/>
-                <a:cs typeface="Times New Roman" panose="02020603050405020304" pitchFamily="18" charset="0"/>
-              </a:rPr>
-              <a:t>Secret serviceman guide </a:t>
-            </a:r>
-            <a:endParaRPr lang="en-GB" dirty="0" smtClean="0">
-              <a:latin typeface="Times New Roman" panose="02020603050405020304" pitchFamily="18" charset="0"/>
-              <a:cs typeface="Times New Roman" panose="02020603050405020304" pitchFamily="18" charset="0"/>
-            </a:endParaRPr>
-          </a:p>
-          <a:p>
-            <a:r>
-              <a:rPr lang="en-GB" dirty="0" smtClean="0">
-                <a:latin typeface="Times New Roman" panose="02020603050405020304" pitchFamily="18" charset="0"/>
-                <a:cs typeface="Times New Roman" panose="02020603050405020304" pitchFamily="18" charset="0"/>
-              </a:rPr>
-              <a:t>Fake Allies (In your character party)</a:t>
-            </a:r>
-          </a:p>
-          <a:p>
-            <a:r>
-              <a:rPr lang="en-GB" dirty="0" smtClean="0">
-                <a:latin typeface="Times New Roman" panose="02020603050405020304" pitchFamily="18" charset="0"/>
-                <a:cs typeface="Times New Roman" panose="02020603050405020304" pitchFamily="18" charset="0"/>
-              </a:rPr>
-              <a:t>Escape into Mexico</a:t>
-            </a:r>
-          </a:p>
-          <a:p>
+              <a:t>Corruption</a:t>
+            </a:r>
             <a:endParaRPr lang="en-GB" dirty="0" smtClean="0"/>
           </a:p>
           <a:p>
@@ -6530,36 +6848,6 @@
       </p:pic>
       <p:pic>
         <p:nvPicPr>
-          <p:cNvPr id="5" name="Picture 4"/>
-          <p:cNvPicPr>
-            <a:picLocks noChangeAspect="1"/>
-          </p:cNvPicPr>
-          <p:nvPr/>
-        </p:nvPicPr>
-        <p:blipFill>
-          <a:blip r:embed="rId3" cstate="print">
-            <a:extLst>
-              <a:ext uri="{28A0092B-C50C-407E-A947-70E740481C1C}">
-                <a14:useLocalDpi xmlns:a14="http://schemas.microsoft.com/office/drawing/2010/main" val="0"/>
-              </a:ext>
-            </a:extLst>
-          </a:blip>
-          <a:stretch>
-            <a:fillRect/>
-          </a:stretch>
-        </p:blipFill>
-        <p:spPr>
-          <a:xfrm>
-            <a:off x="9359929" y="3621153"/>
-            <a:ext cx="2002972" cy="2002972"/>
-          </a:xfrm>
-          <a:prstGeom prst="rect">
-            <a:avLst/>
-          </a:prstGeom>
-        </p:spPr>
-      </p:pic>
-      <p:pic>
-        <p:nvPicPr>
           <p:cNvPr id="6" name="Picture 5"/>
           <p:cNvPicPr>
             <a:picLocks noChangeAspect="1"/>
@@ -6567,7 +6855,7 @@
           <p:nvPr/>
         </p:nvPicPr>
         <p:blipFill rotWithShape="1">
-          <a:blip r:embed="rId4">
+          <a:blip r:embed="rId3">
             <a:extLst>
               <a:ext uri="{28A0092B-C50C-407E-A947-70E740481C1C}">
                 <a14:useLocalDpi xmlns:a14="http://schemas.microsoft.com/office/drawing/2010/main" val="0"/>
@@ -6579,7 +6867,7 @@
         </p:blipFill>
         <p:spPr>
           <a:xfrm>
-            <a:off x="7232135" y="3621153"/>
+            <a:off x="8274611" y="3562538"/>
             <a:ext cx="1942774" cy="2002972"/>
           </a:xfrm>
           <a:prstGeom prst="rect">
@@ -6634,27 +6922,23 @@
             <p:ph type="title"/>
           </p:nvPr>
         </p:nvSpPr>
-        <p:spPr>
-          <a:xfrm>
-            <a:off x="825529" y="788168"/>
-            <a:ext cx="8534400" cy="1507067"/>
-          </a:xfrm>
-        </p:spPr>
+        <p:spPr/>
         <p:txBody>
           <a:bodyPr/>
           <a:lstStyle/>
           <a:p>
             <a:r>
-              <a:rPr lang="en-GB" dirty="0" smtClean="0">
-                <a:latin typeface="Arial" panose="020B0604020202020204" pitchFamily="34" charset="0"/>
-                <a:cs typeface="Arial" panose="020B0604020202020204" pitchFamily="34" charset="0"/>
-              </a:rPr>
-              <a:t>Context/Environment</a:t>
-            </a:r>
-            <a:endParaRPr lang="en-GB" dirty="0">
-              <a:latin typeface="Arial" panose="020B0604020202020204" pitchFamily="34" charset="0"/>
-              <a:cs typeface="Arial" panose="020B0604020202020204" pitchFamily="34" charset="0"/>
-            </a:endParaRPr>
+              <a:rPr lang="en-GB" dirty="0" smtClean="0"/>
+              <a:t>Current Games Similar to mine</a:t>
+            </a:r>
+            <a:br>
+              <a:rPr lang="en-GB" dirty="0" smtClean="0"/>
+            </a:br>
+            <a:r>
+              <a:rPr lang="en-GB" dirty="0" smtClean="0"/>
+              <a:t>What I got Inspiration from</a:t>
+            </a:r>
+            <a:endParaRPr lang="en-GB" dirty="0"/>
           </a:p>
         </p:txBody>
       </p:sp>
@@ -6668,183 +6952,25 @@
             <p:ph idx="1"/>
           </p:nvPr>
         </p:nvSpPr>
-        <p:spPr>
-          <a:xfrm>
-            <a:off x="825529" y="1772302"/>
-            <a:ext cx="8534400" cy="3615267"/>
-          </a:xfrm>
-        </p:spPr>
+        <p:spPr/>
         <p:txBody>
           <a:bodyPr/>
           <a:lstStyle/>
           <a:p>
-            <a:r>
-              <a:rPr lang="en-GB" dirty="0" smtClean="0">
-                <a:latin typeface="Times New Roman" panose="02020603050405020304" pitchFamily="18" charset="0"/>
-                <a:cs typeface="Times New Roman" panose="02020603050405020304" pitchFamily="18" charset="0"/>
-              </a:rPr>
-              <a:t>Encounter Political characters/Rivals</a:t>
-            </a:r>
-          </a:p>
-          <a:p>
-            <a:r>
-              <a:rPr lang="en-GB" dirty="0" smtClean="0">
-                <a:latin typeface="Times New Roman" panose="02020603050405020304" pitchFamily="18" charset="0"/>
-                <a:cs typeface="Times New Roman" panose="02020603050405020304" pitchFamily="18" charset="0"/>
-              </a:rPr>
-              <a:t>Levels in/and cities have elements of destruction &amp; vegetation</a:t>
-            </a:r>
-          </a:p>
-          <a:p>
-            <a:r>
-              <a:rPr lang="en-GB" dirty="0" smtClean="0">
-                <a:latin typeface="Times New Roman" panose="02020603050405020304" pitchFamily="18" charset="0"/>
-                <a:cs typeface="Times New Roman" panose="02020603050405020304" pitchFamily="18" charset="0"/>
-              </a:rPr>
-              <a:t>Challenge increases as player progresses </a:t>
-            </a:r>
-          </a:p>
-          <a:p>
-            <a:r>
-              <a:rPr lang="en-GB" dirty="0" smtClean="0">
-                <a:latin typeface="Times New Roman" panose="02020603050405020304" pitchFamily="18" charset="0"/>
-                <a:cs typeface="Times New Roman" panose="02020603050405020304" pitchFamily="18" charset="0"/>
-              </a:rPr>
-              <a:t>Rivals/ Enemies get stronger</a:t>
-            </a:r>
-          </a:p>
-          <a:p>
-            <a:r>
-              <a:rPr lang="en-GB" dirty="0" smtClean="0">
-                <a:latin typeface="Times New Roman" panose="02020603050405020304" pitchFamily="18" charset="0"/>
-                <a:cs typeface="Times New Roman" panose="02020603050405020304" pitchFamily="18" charset="0"/>
-              </a:rPr>
-              <a:t>Collect articles (Intel) objects in game </a:t>
-            </a:r>
-          </a:p>
-          <a:p>
-            <a:r>
-              <a:rPr lang="en-GB" dirty="0" smtClean="0">
-                <a:latin typeface="Times New Roman" panose="02020603050405020304" pitchFamily="18" charset="0"/>
-                <a:cs typeface="Times New Roman" panose="02020603050405020304" pitchFamily="18" charset="0"/>
-              </a:rPr>
-              <a:t>To progress through certain states/ cities they’ll be main enemies</a:t>
-            </a:r>
-          </a:p>
-          <a:p>
-            <a:pPr marL="0" indent="0">
-              <a:buNone/>
-            </a:pPr>
-            <a:endParaRPr lang="en-GB" dirty="0" smtClean="0"/>
-          </a:p>
-        </p:txBody>
-      </p:sp>
-      <p:pic>
-        <p:nvPicPr>
-          <p:cNvPr id="4" name="Picture 3"/>
-          <p:cNvPicPr>
-            <a:picLocks noChangeAspect="1"/>
-          </p:cNvPicPr>
-          <p:nvPr/>
-        </p:nvPicPr>
-        <p:blipFill>
-          <a:blip r:embed="rId2" cstate="print">
-            <a:extLst>
-              <a:ext uri="{28A0092B-C50C-407E-A947-70E740481C1C}">
-                <a14:useLocalDpi xmlns:a14="http://schemas.microsoft.com/office/drawing/2010/main" val="0"/>
-              </a:ext>
-            </a:extLst>
-          </a:blip>
-          <a:stretch>
-            <a:fillRect/>
-          </a:stretch>
-        </p:blipFill>
-        <p:spPr>
-          <a:xfrm>
-            <a:off x="8155896" y="788168"/>
-            <a:ext cx="3426504" cy="1780116"/>
-          </a:xfrm>
-          <a:prstGeom prst="rect">
-            <a:avLst/>
-          </a:prstGeom>
-        </p:spPr>
-      </p:pic>
-      <p:pic>
-        <p:nvPicPr>
-          <p:cNvPr id="5" name="Picture 4"/>
-          <p:cNvPicPr>
-            <a:picLocks noChangeAspect="1"/>
-          </p:cNvPicPr>
-          <p:nvPr/>
-        </p:nvPicPr>
-        <p:blipFill rotWithShape="1">
-          <a:blip r:embed="rId3" cstate="print">
-            <a:extLst>
-              <a:ext uri="{28A0092B-C50C-407E-A947-70E740481C1C}">
-                <a14:useLocalDpi xmlns:a14="http://schemas.microsoft.com/office/drawing/2010/main" val="0"/>
-              </a:ext>
-            </a:extLst>
-          </a:blip>
-          <a:srcRect t="4803"/>
-          <a:stretch/>
-        </p:blipFill>
-        <p:spPr>
-          <a:xfrm>
-            <a:off x="8155896" y="2666565"/>
-            <a:ext cx="3411401" cy="1826739"/>
-          </a:xfrm>
-          <a:prstGeom prst="rect">
-            <a:avLst/>
-          </a:prstGeom>
-        </p:spPr>
-      </p:pic>
-      <p:pic>
-        <p:nvPicPr>
-          <p:cNvPr id="6" name="Picture 5"/>
-          <p:cNvPicPr>
-            <a:picLocks noChangeAspect="1"/>
-          </p:cNvPicPr>
-          <p:nvPr/>
-        </p:nvPicPr>
-        <p:blipFill>
-          <a:blip r:embed="rId4" cstate="print">
-            <a:extLst>
-              <a:ext uri="{28A0092B-C50C-407E-A947-70E740481C1C}">
-                <a14:useLocalDpi xmlns:a14="http://schemas.microsoft.com/office/drawing/2010/main" val="0"/>
-              </a:ext>
-            </a:extLst>
-          </a:blip>
-          <a:stretch>
-            <a:fillRect/>
-          </a:stretch>
-        </p:blipFill>
-        <p:spPr>
-          <a:xfrm>
-            <a:off x="8162818" y="4591585"/>
-            <a:ext cx="3404479" cy="1915020"/>
-          </a:xfrm>
-          <a:prstGeom prst="rect">
-            <a:avLst/>
-          </a:prstGeom>
-        </p:spPr>
-      </p:pic>
+            <a:endParaRPr lang="en-GB" dirty="0"/>
+          </a:p>
+        </p:txBody>
+      </p:sp>
     </p:spTree>
     <p:extLst>
       <p:ext uri="{BB962C8B-B14F-4D97-AF65-F5344CB8AC3E}">
-        <p14:creationId xmlns:p14="http://schemas.microsoft.com/office/powerpoint/2010/main" val="1676115733"/>
+        <p14:creationId xmlns:p14="http://schemas.microsoft.com/office/powerpoint/2010/main" val="698706026"/>
       </p:ext>
     </p:extLst>
   </p:cSld>
   <p:clrMapOvr>
     <a:masterClrMapping/>
   </p:clrMapOvr>
-  <p:timing>
-    <p:tnLst>
-      <p:par>
-        <p:cTn id="1" dur="indefinite" restart="never" nodeType="tmRoot"/>
-      </p:par>
-    </p:tnLst>
-  </p:timing>
 </p:sld>
 </file>
 
@@ -6877,8 +7003,8 @@
         </p:nvSpPr>
         <p:spPr>
           <a:xfrm>
-            <a:off x="825529" y="540518"/>
-            <a:ext cx="8534400" cy="1507067"/>
+            <a:off x="817216" y="841279"/>
+            <a:ext cx="8759270" cy="1507067"/>
           </a:xfrm>
         </p:spPr>
         <p:txBody>
@@ -6890,7 +7016,7 @@
                 <a:latin typeface="Arial" panose="020B0604020202020204" pitchFamily="34" charset="0"/>
                 <a:cs typeface="Arial" panose="020B0604020202020204" pitchFamily="34" charset="0"/>
               </a:rPr>
-              <a:t>Characters</a:t>
+              <a:t>Target Audience Survey Results</a:t>
             </a:r>
             <a:endParaRPr lang="en-GB" dirty="0">
               <a:latin typeface="Arial" panose="020B0604020202020204" pitchFamily="34" charset="0"/>
@@ -6911,7 +7037,7 @@
         </p:nvSpPr>
         <p:spPr>
           <a:xfrm>
-            <a:off x="825529" y="1763220"/>
+            <a:off x="817216" y="1932709"/>
             <a:ext cx="8534400" cy="3615267"/>
           </a:xfrm>
         </p:spPr>
@@ -6924,7 +7050,7 @@
                 <a:latin typeface="Times New Roman" panose="02020603050405020304" pitchFamily="18" charset="0"/>
                 <a:cs typeface="Times New Roman" panose="02020603050405020304" pitchFamily="18" charset="0"/>
               </a:rPr>
-              <a:t>Players Character (Trump)</a:t>
+              <a:t>Used Survey Monkey and posted over social media</a:t>
             </a:r>
           </a:p>
           <a:p>
@@ -6933,7 +7059,7 @@
                 <a:latin typeface="Times New Roman" panose="02020603050405020304" pitchFamily="18" charset="0"/>
                 <a:cs typeface="Times New Roman" panose="02020603050405020304" pitchFamily="18" charset="0"/>
               </a:rPr>
-              <a:t>Allies (Trump enthusiasts/voters)</a:t>
+              <a:t>(Results)</a:t>
             </a:r>
           </a:p>
           <a:p>
@@ -6942,258 +7068,21 @@
                 <a:latin typeface="Times New Roman" panose="02020603050405020304" pitchFamily="18" charset="0"/>
                 <a:cs typeface="Times New Roman" panose="02020603050405020304" pitchFamily="18" charset="0"/>
               </a:rPr>
-              <a:t>Enemies (Rival Politicians, American People)</a:t>
-            </a:r>
-          </a:p>
-          <a:p>
-            <a:r>
-              <a:rPr lang="en-GB" dirty="0">
-                <a:latin typeface="Times New Roman" panose="02020603050405020304" pitchFamily="18" charset="0"/>
-                <a:cs typeface="Times New Roman" panose="02020603050405020304" pitchFamily="18" charset="0"/>
-              </a:rPr>
-              <a:t>Heroes </a:t>
-            </a:r>
-            <a:r>
-              <a:rPr lang="en-GB" dirty="0" smtClean="0">
-                <a:latin typeface="Times New Roman" panose="02020603050405020304" pitchFamily="18" charset="0"/>
-                <a:cs typeface="Times New Roman" panose="02020603050405020304" pitchFamily="18" charset="0"/>
-              </a:rPr>
-              <a:t>(Party Members, Secret Service)</a:t>
-            </a:r>
-          </a:p>
-          <a:p>
-            <a:r>
-              <a:rPr lang="en-GB" dirty="0" smtClean="0">
-                <a:latin typeface="Times New Roman" panose="02020603050405020304" pitchFamily="18" charset="0"/>
-                <a:cs typeface="Times New Roman" panose="02020603050405020304" pitchFamily="18" charset="0"/>
-              </a:rPr>
-              <a:t>National Guard &amp; Police</a:t>
-            </a:r>
-          </a:p>
-          <a:p>
-            <a:r>
-              <a:rPr lang="en-GB" dirty="0" smtClean="0">
-                <a:latin typeface="Times New Roman" panose="02020603050405020304" pitchFamily="18" charset="0"/>
-                <a:cs typeface="Times New Roman" panose="02020603050405020304" pitchFamily="18" charset="0"/>
-              </a:rPr>
-              <a:t>Mexican Police &amp; People</a:t>
-            </a:r>
+              <a:t>(Questions Asked)</a:t>
+            </a:r>
+          </a:p>
+          <a:p>
             <a:endParaRPr lang="en-GB" dirty="0">
               <a:latin typeface="Times New Roman" panose="02020603050405020304" pitchFamily="18" charset="0"/>
               <a:cs typeface="Times New Roman" panose="02020603050405020304" pitchFamily="18" charset="0"/>
             </a:endParaRPr>
           </a:p>
-          <a:p>
-            <a:endParaRPr lang="en-GB" dirty="0" smtClean="0"/>
-          </a:p>
-        </p:txBody>
-      </p:sp>
-      <p:pic>
-        <p:nvPicPr>
-          <p:cNvPr id="4" name="Picture 3"/>
-          <p:cNvPicPr>
-            <a:picLocks noChangeAspect="1"/>
-          </p:cNvPicPr>
-          <p:nvPr/>
-        </p:nvPicPr>
-        <p:blipFill>
-          <a:blip r:embed="rId2" cstate="print">
-            <a:extLst>
-              <a:ext uri="{28A0092B-C50C-407E-A947-70E740481C1C}">
-                <a14:useLocalDpi xmlns:a14="http://schemas.microsoft.com/office/drawing/2010/main" val="0"/>
-              </a:ext>
-            </a:extLst>
-          </a:blip>
-          <a:stretch>
-            <a:fillRect/>
-          </a:stretch>
-        </p:blipFill>
-        <p:spPr>
-          <a:xfrm>
-            <a:off x="7381775" y="965545"/>
-            <a:ext cx="1708484" cy="2164080"/>
-          </a:xfrm>
-          <a:prstGeom prst="rect">
-            <a:avLst/>
-          </a:prstGeom>
-        </p:spPr>
-      </p:pic>
-      <p:sp>
-        <p:nvSpPr>
-          <p:cNvPr id="5" name="AutoShape 2" descr="Image result for clinton"/>
-          <p:cNvSpPr>
-            <a:spLocks noChangeAspect="1" noChangeArrowheads="1"/>
-          </p:cNvSpPr>
-          <p:nvPr/>
-        </p:nvSpPr>
-        <p:spPr bwMode="auto">
-          <a:xfrm>
-            <a:off x="520729" y="528780"/>
-            <a:ext cx="304800" cy="304800"/>
-          </a:xfrm>
-          <a:prstGeom prst="rect">
-            <a:avLst/>
-          </a:prstGeom>
-          <a:noFill/>
-          <a:extLst>
-            <a:ext uri="{909E8E84-426E-40DD-AFC4-6F175D3DCCD1}">
-              <a14:hiddenFill xmlns:a14="http://schemas.microsoft.com/office/drawing/2010/main">
-                <a:solidFill>
-                  <a:srgbClr val="FFFFFF"/>
-                </a:solidFill>
-              </a14:hiddenFill>
-            </a:ext>
-          </a:extLst>
-        </p:spPr>
-        <p:txBody>
-          <a:bodyPr vert="horz" wrap="square" lIns="91440" tIns="45720" rIns="91440" bIns="45720" numCol="1" anchor="t" anchorCtr="0" compatLnSpc="1">
-            <a:prstTxWarp prst="textNoShape">
-              <a:avLst/>
-            </a:prstTxWarp>
-          </a:bodyPr>
-          <a:lstStyle/>
-          <a:p>
-            <a:endParaRPr lang="en-GB"/>
-          </a:p>
-        </p:txBody>
-      </p:sp>
-      <p:pic>
-        <p:nvPicPr>
-          <p:cNvPr id="8" name="Picture 7"/>
-          <p:cNvPicPr>
-            <a:picLocks noChangeAspect="1"/>
-          </p:cNvPicPr>
-          <p:nvPr/>
-        </p:nvPicPr>
-        <p:blipFill>
-          <a:blip r:embed="rId3" cstate="print">
-            <a:extLst>
-              <a:ext uri="{28A0092B-C50C-407E-A947-70E740481C1C}">
-                <a14:useLocalDpi xmlns:a14="http://schemas.microsoft.com/office/drawing/2010/main" val="0"/>
-              </a:ext>
-            </a:extLst>
-          </a:blip>
-          <a:stretch>
-            <a:fillRect/>
-          </a:stretch>
-        </p:blipFill>
-        <p:spPr>
-          <a:xfrm>
-            <a:off x="9359930" y="965546"/>
-            <a:ext cx="2164080" cy="2164080"/>
-          </a:xfrm>
-          <a:prstGeom prst="rect">
-            <a:avLst/>
-          </a:prstGeom>
-        </p:spPr>
-      </p:pic>
-      <p:pic>
-        <p:nvPicPr>
-          <p:cNvPr id="1032" name="Picture 8" descr="Image result for trump voters&quot;">
-            <a:hlinkClick r:id="rId4"/>
-          </p:cNvPr>
-          <p:cNvPicPr>
-            <a:picLocks noChangeAspect="1" noChangeArrowheads="1"/>
-          </p:cNvPicPr>
-          <p:nvPr/>
-        </p:nvPicPr>
-        <p:blipFill>
-          <a:blip r:embed="rId5">
-            <a:extLst>
-              <a:ext uri="{28A0092B-C50C-407E-A947-70E740481C1C}">
-                <a14:useLocalDpi xmlns:a14="http://schemas.microsoft.com/office/drawing/2010/main" val="0"/>
-              </a:ext>
-            </a:extLst>
-          </a:blip>
-          <a:srcRect/>
-          <a:stretch>
-            <a:fillRect/>
-          </a:stretch>
-        </p:blipFill>
-        <p:spPr bwMode="auto">
-          <a:xfrm>
-            <a:off x="6297295" y="3228685"/>
-            <a:ext cx="2657856" cy="1661160"/>
-          </a:xfrm>
-          <a:prstGeom prst="rect">
-            <a:avLst/>
-          </a:prstGeom>
-          <a:noFill/>
-          <a:extLst>
-            <a:ext uri="{909E8E84-426E-40DD-AFC4-6F175D3DCCD1}">
-              <a14:hiddenFill xmlns:a14="http://schemas.microsoft.com/office/drawing/2010/main">
-                <a:solidFill>
-                  <a:srgbClr val="FFFFFF"/>
-                </a:solidFill>
-              </a14:hiddenFill>
-            </a:ext>
-          </a:extLst>
-        </p:spPr>
-      </p:pic>
-      <p:pic>
-        <p:nvPicPr>
-          <p:cNvPr id="9" name="Picture 8"/>
-          <p:cNvPicPr>
-            <a:picLocks noChangeAspect="1"/>
-          </p:cNvPicPr>
-          <p:nvPr/>
-        </p:nvPicPr>
-        <p:blipFill>
-          <a:blip r:embed="rId6">
-            <a:extLst>
-              <a:ext uri="{28A0092B-C50C-407E-A947-70E740481C1C}">
-                <a14:useLocalDpi xmlns:a14="http://schemas.microsoft.com/office/drawing/2010/main" val="0"/>
-              </a:ext>
-            </a:extLst>
-          </a:blip>
-          <a:stretch>
-            <a:fillRect/>
-          </a:stretch>
-        </p:blipFill>
-        <p:spPr>
-          <a:xfrm>
-            <a:off x="9090259" y="3437926"/>
-            <a:ext cx="2687786" cy="2597113"/>
-          </a:xfrm>
-          <a:prstGeom prst="rect">
-            <a:avLst/>
-          </a:prstGeom>
-        </p:spPr>
-      </p:pic>
-      <p:pic>
-        <p:nvPicPr>
-          <p:cNvPr id="11" name="Picture 10"/>
-          <p:cNvPicPr>
-            <a:picLocks noChangeAspect="1"/>
-          </p:cNvPicPr>
-          <p:nvPr/>
-        </p:nvPicPr>
-        <p:blipFill>
-          <a:blip r:embed="rId7">
-            <a:extLst>
-              <a:ext uri="{28A0092B-C50C-407E-A947-70E740481C1C}">
-                <a14:useLocalDpi xmlns:a14="http://schemas.microsoft.com/office/drawing/2010/main" val="0"/>
-              </a:ext>
-            </a:extLst>
-          </a:blip>
-          <a:stretch>
-            <a:fillRect/>
-          </a:stretch>
-        </p:blipFill>
-        <p:spPr>
-          <a:xfrm>
-            <a:off x="6284963" y="4940990"/>
-            <a:ext cx="2670188" cy="1367137"/>
-          </a:xfrm>
-          <a:prstGeom prst="rect">
-            <a:avLst/>
-          </a:prstGeom>
-        </p:spPr>
-      </p:pic>
+        </p:txBody>
+      </p:sp>
     </p:spTree>
     <p:extLst>
       <p:ext uri="{BB962C8B-B14F-4D97-AF65-F5344CB8AC3E}">
-        <p14:creationId xmlns:p14="http://schemas.microsoft.com/office/powerpoint/2010/main" val="2689151660"/>
+        <p14:creationId xmlns:p14="http://schemas.microsoft.com/office/powerpoint/2010/main" val="1306020195"/>
       </p:ext>
     </p:extLst>
   </p:cSld>
@@ -7239,7 +7128,7 @@
         </p:nvSpPr>
         <p:spPr>
           <a:xfrm>
-            <a:off x="825529" y="635768"/>
+            <a:off x="817216" y="841279"/>
             <a:ext cx="8534400" cy="1507067"/>
           </a:xfrm>
         </p:spPr>
@@ -7252,7 +7141,7 @@
                 <a:latin typeface="Arial" panose="020B0604020202020204" pitchFamily="34" charset="0"/>
                 <a:cs typeface="Arial" panose="020B0604020202020204" pitchFamily="34" charset="0"/>
               </a:rPr>
-              <a:t>Gameplay</a:t>
+              <a:t>Target Audience/Profile</a:t>
             </a:r>
             <a:endParaRPr lang="en-GB" dirty="0">
               <a:latin typeface="Arial" panose="020B0604020202020204" pitchFamily="34" charset="0"/>
@@ -7273,23 +7162,32 @@
         </p:nvSpPr>
         <p:spPr>
           <a:xfrm>
-            <a:off x="825529" y="1739053"/>
+            <a:off x="764462" y="2096832"/>
             <a:ext cx="8534400" cy="3615267"/>
           </a:xfrm>
         </p:spPr>
         <p:txBody>
-          <a:bodyPr>
-            <a:normAutofit/>
-          </a:bodyPr>
-          <a:lstStyle/>
-          <a:p>
+          <a:bodyPr/>
+          <a:lstStyle/>
+          <a:p>
+            <a:r>
+              <a:rPr lang="en-GB" dirty="0">
+                <a:latin typeface="Times New Roman" panose="02020603050405020304" pitchFamily="18" charset="0"/>
+                <a:cs typeface="Times New Roman" panose="02020603050405020304" pitchFamily="18" charset="0"/>
+              </a:rPr>
+              <a:t>Target age of players: 16</a:t>
+            </a:r>
             <a:r>
               <a:rPr lang="en-GB" dirty="0" smtClean="0">
                 <a:latin typeface="Times New Roman" panose="02020603050405020304" pitchFamily="18" charset="0"/>
                 <a:cs typeface="Times New Roman" panose="02020603050405020304" pitchFamily="18" charset="0"/>
               </a:rPr>
-              <a:t>Moving across the map to try and escape America </a:t>
-            </a:r>
+              <a:t>+ </a:t>
+            </a:r>
+            <a:endParaRPr lang="en-GB" dirty="0" smtClean="0">
+              <a:latin typeface="Times New Roman" panose="02020603050405020304" pitchFamily="18" charset="0"/>
+              <a:cs typeface="Times New Roman" panose="02020603050405020304" pitchFamily="18" charset="0"/>
+            </a:endParaRPr>
           </a:p>
           <a:p>
             <a:r>
@@ -7297,25 +7195,28 @@
                 <a:latin typeface="Times New Roman" panose="02020603050405020304" pitchFamily="18" charset="0"/>
                 <a:cs typeface="Times New Roman" panose="02020603050405020304" pitchFamily="18" charset="0"/>
               </a:rPr>
-              <a:t>Gather influence/ collectables to earn in game currency</a:t>
-            </a:r>
-          </a:p>
-          <a:p>
+              <a:t>PEGI</a:t>
+            </a:r>
+            <a:r>
+              <a:rPr lang="en-GB" dirty="0">
+                <a:latin typeface="Times New Roman" panose="02020603050405020304" pitchFamily="18" charset="0"/>
+                <a:cs typeface="Times New Roman" panose="02020603050405020304" pitchFamily="18" charset="0"/>
+              </a:rPr>
+              <a:t>/ ESRB rating</a:t>
+            </a:r>
             <a:r>
               <a:rPr lang="en-GB" dirty="0" smtClean="0">
                 <a:latin typeface="Times New Roman" panose="02020603050405020304" pitchFamily="18" charset="0"/>
                 <a:cs typeface="Times New Roman" panose="02020603050405020304" pitchFamily="18" charset="0"/>
               </a:rPr>
-              <a:t>Player character dies, respawn at last save</a:t>
-            </a:r>
-          </a:p>
-          <a:p>
+              <a:t>: </a:t>
+            </a:r>
             <a:r>
               <a:rPr lang="en-GB" dirty="0" smtClean="0">
                 <a:latin typeface="Times New Roman" panose="02020603050405020304" pitchFamily="18" charset="0"/>
                 <a:cs typeface="Times New Roman" panose="02020603050405020304" pitchFamily="18" charset="0"/>
               </a:rPr>
-              <a:t>In the levels the player is introduced to new abilities </a:t>
+              <a:t>16</a:t>
             </a:r>
           </a:p>
           <a:p>
@@ -7324,11 +7225,82 @@
                 <a:latin typeface="Times New Roman" panose="02020603050405020304" pitchFamily="18" charset="0"/>
                 <a:cs typeface="Times New Roman" panose="02020603050405020304" pitchFamily="18" charset="0"/>
               </a:rPr>
-              <a:t>Empathise with rivals/enemies </a:t>
-            </a:r>
-          </a:p>
-        </p:txBody>
-      </p:sp>
+              <a:t>Players who like Tactical, Exploration &amp; Social Games</a:t>
+            </a:r>
+          </a:p>
+          <a:p>
+            <a:r>
+              <a:rPr lang="en-GB" dirty="0">
+                <a:latin typeface="Times New Roman" panose="02020603050405020304" pitchFamily="18" charset="0"/>
+                <a:cs typeface="Times New Roman" panose="02020603050405020304" pitchFamily="18" charset="0"/>
+              </a:rPr>
+              <a:t>Intended game systems: Android/Apple </a:t>
+            </a:r>
+            <a:r>
+              <a:rPr lang="en-GB" dirty="0" smtClean="0">
+                <a:latin typeface="Times New Roman" panose="02020603050405020304" pitchFamily="18" charset="0"/>
+                <a:cs typeface="Times New Roman" panose="02020603050405020304" pitchFamily="18" charset="0"/>
+              </a:rPr>
+              <a:t>Mobile or console depending on survey results</a:t>
+            </a:r>
+            <a:endParaRPr lang="en-GB" dirty="0">
+              <a:latin typeface="Times New Roman" panose="02020603050405020304" pitchFamily="18" charset="0"/>
+              <a:cs typeface="Times New Roman" panose="02020603050405020304" pitchFamily="18" charset="0"/>
+            </a:endParaRPr>
+          </a:p>
+          <a:p>
+            <a:pPr marL="0" indent="0">
+              <a:buNone/>
+            </a:pPr>
+            <a:endParaRPr lang="en-GB" dirty="0" smtClean="0">
+              <a:latin typeface="Times New Roman" panose="02020603050405020304" pitchFamily="18" charset="0"/>
+              <a:cs typeface="Times New Roman" panose="02020603050405020304" pitchFamily="18" charset="0"/>
+            </a:endParaRPr>
+          </a:p>
+          <a:p>
+            <a:endParaRPr lang="en-GB" dirty="0" smtClean="0">
+              <a:latin typeface="Times New Roman" panose="02020603050405020304" pitchFamily="18" charset="0"/>
+              <a:cs typeface="Times New Roman" panose="02020603050405020304" pitchFamily="18" charset="0"/>
+            </a:endParaRPr>
+          </a:p>
+          <a:p>
+            <a:endParaRPr lang="en-GB" dirty="0">
+              <a:latin typeface="Times New Roman" panose="02020603050405020304" pitchFamily="18" charset="0"/>
+              <a:cs typeface="Times New Roman" panose="02020603050405020304" pitchFamily="18" charset="0"/>
+            </a:endParaRPr>
+          </a:p>
+        </p:txBody>
+      </p:sp>
+      <p:pic>
+        <p:nvPicPr>
+          <p:cNvPr id="4" name="Picture 3"/>
+          <p:cNvPicPr>
+            <a:picLocks noChangeAspect="1"/>
+          </p:cNvPicPr>
+          <p:nvPr/>
+        </p:nvPicPr>
+        <p:blipFill>
+          <a:blip r:embed="rId2" cstate="print">
+            <a:extLst>
+              <a:ext uri="{28A0092B-C50C-407E-A947-70E740481C1C}">
+                <a14:useLocalDpi xmlns:a14="http://schemas.microsoft.com/office/drawing/2010/main" val="0"/>
+              </a:ext>
+            </a:extLst>
+          </a:blip>
+          <a:stretch>
+            <a:fillRect/>
+          </a:stretch>
+        </p:blipFill>
+        <p:spPr>
+          <a:xfrm>
+            <a:off x="9351616" y="621762"/>
+            <a:ext cx="1074248" cy="1310947"/>
+          </a:xfrm>
+          <a:prstGeom prst="rect">
+            <a:avLst/>
+          </a:prstGeom>
+        </p:spPr>
+      </p:pic>
       <p:pic>
         <p:nvPicPr>
           <p:cNvPr id="5" name="Picture 4"/>
@@ -7338,39 +7310,21 @@
           <p:nvPr/>
         </p:nvPicPr>
         <p:blipFill>
-          <a:blip r:embed="rId2"/>
+          <a:blip r:embed="rId3" cstate="print">
+            <a:extLst>
+              <a:ext uri="{28A0092B-C50C-407E-A947-70E740481C1C}">
+                <a14:useLocalDpi xmlns:a14="http://schemas.microsoft.com/office/drawing/2010/main" val="0"/>
+              </a:ext>
+            </a:extLst>
+          </a:blip>
           <a:stretch>
             <a:fillRect/>
           </a:stretch>
         </p:blipFill>
         <p:spPr>
           <a:xfrm>
-            <a:off x="7660663" y="2373724"/>
-            <a:ext cx="3777461" cy="2139314"/>
-          </a:xfrm>
-          <a:prstGeom prst="rect">
-            <a:avLst/>
-          </a:prstGeom>
-        </p:spPr>
-      </p:pic>
-      <p:pic>
-        <p:nvPicPr>
-          <p:cNvPr id="8" name="Picture 7"/>
-          <p:cNvPicPr>
-            <a:picLocks noChangeAspect="1"/>
-          </p:cNvPicPr>
-          <p:nvPr/>
-        </p:nvPicPr>
-        <p:blipFill>
-          <a:blip r:embed="rId3"/>
-          <a:stretch>
-            <a:fillRect/>
-          </a:stretch>
-        </p:blipFill>
-        <p:spPr>
-          <a:xfrm>
-            <a:off x="6918960" y="4593019"/>
-            <a:ext cx="4709159" cy="2125662"/>
+            <a:off x="7997780" y="2014006"/>
+            <a:ext cx="949374" cy="949374"/>
           </a:xfrm>
           <a:prstGeom prst="rect">
             <a:avLst/>
@@ -7399,8 +7353,68 @@
         </p:blipFill>
         <p:spPr>
           <a:xfrm>
-            <a:off x="8040652" y="75115"/>
-            <a:ext cx="3397472" cy="2264981"/>
+            <a:off x="8933300" y="2021348"/>
+            <a:ext cx="942032" cy="942032"/>
+          </a:xfrm>
+          <a:prstGeom prst="rect">
+            <a:avLst/>
+          </a:prstGeom>
+        </p:spPr>
+      </p:pic>
+      <p:pic>
+        <p:nvPicPr>
+          <p:cNvPr id="7" name="Picture 6"/>
+          <p:cNvPicPr>
+            <a:picLocks noChangeAspect="1"/>
+          </p:cNvPicPr>
+          <p:nvPr/>
+        </p:nvPicPr>
+        <p:blipFill>
+          <a:blip r:embed="rId5" cstate="print">
+            <a:extLst>
+              <a:ext uri="{28A0092B-C50C-407E-A947-70E740481C1C}">
+                <a14:useLocalDpi xmlns:a14="http://schemas.microsoft.com/office/drawing/2010/main" val="0"/>
+              </a:ext>
+            </a:extLst>
+          </a:blip>
+          <a:stretch>
+            <a:fillRect/>
+          </a:stretch>
+        </p:blipFill>
+        <p:spPr>
+          <a:xfrm>
+            <a:off x="9868820" y="2014006"/>
+            <a:ext cx="949374" cy="949374"/>
+          </a:xfrm>
+          <a:prstGeom prst="rect">
+            <a:avLst/>
+          </a:prstGeom>
+        </p:spPr>
+      </p:pic>
+      <p:pic>
+        <p:nvPicPr>
+          <p:cNvPr id="8" name="Picture 7"/>
+          <p:cNvPicPr>
+            <a:picLocks noChangeAspect="1"/>
+          </p:cNvPicPr>
+          <p:nvPr/>
+        </p:nvPicPr>
+        <p:blipFill>
+          <a:blip r:embed="rId6" cstate="print">
+            <a:extLst>
+              <a:ext uri="{28A0092B-C50C-407E-A947-70E740481C1C}">
+                <a14:useLocalDpi xmlns:a14="http://schemas.microsoft.com/office/drawing/2010/main" val="0"/>
+              </a:ext>
+            </a:extLst>
+          </a:blip>
+          <a:stretch>
+            <a:fillRect/>
+          </a:stretch>
+        </p:blipFill>
+        <p:spPr>
+          <a:xfrm>
+            <a:off x="10810852" y="2021348"/>
+            <a:ext cx="942032" cy="942032"/>
           </a:xfrm>
           <a:prstGeom prst="rect">
             <a:avLst/>
@@ -7410,7 +7424,7 @@
     </p:spTree>
     <p:extLst>
       <p:ext uri="{BB962C8B-B14F-4D97-AF65-F5344CB8AC3E}">
-        <p14:creationId xmlns:p14="http://schemas.microsoft.com/office/powerpoint/2010/main" val="3347684022"/>
+        <p14:creationId xmlns:p14="http://schemas.microsoft.com/office/powerpoint/2010/main" val="3700116584"/>
       </p:ext>
     </p:extLst>
   </p:cSld>
@@ -7456,7 +7470,7 @@
         </p:nvSpPr>
         <p:spPr>
           <a:xfrm>
-            <a:off x="825529" y="788168"/>
+            <a:off x="825529" y="635768"/>
             <a:ext cx="8534400" cy="1507067"/>
           </a:xfrm>
         </p:spPr>
@@ -7469,7 +7483,7 @@
                 <a:latin typeface="Arial" panose="020B0604020202020204" pitchFamily="34" charset="0"/>
                 <a:cs typeface="Arial" panose="020B0604020202020204" pitchFamily="34" charset="0"/>
               </a:rPr>
-              <a:t>Game Balancing</a:t>
+              <a:t>Gameplay &amp; Environment</a:t>
             </a:r>
             <a:endParaRPr lang="en-GB" dirty="0">
               <a:latin typeface="Arial" panose="020B0604020202020204" pitchFamily="34" charset="0"/>
@@ -7490,29 +7504,35 @@
         </p:nvSpPr>
         <p:spPr>
           <a:xfrm>
-            <a:off x="825529" y="1863742"/>
+            <a:off x="739139" y="2040583"/>
             <a:ext cx="8534400" cy="3615267"/>
           </a:xfrm>
         </p:spPr>
         <p:txBody>
-          <a:bodyPr/>
-          <a:lstStyle/>
+          <a:bodyPr>
+            <a:normAutofit/>
+          </a:bodyPr>
+          <a:lstStyle/>
+          <a:p>
+            <a:endParaRPr lang="en-GB" dirty="0" smtClean="0">
+              <a:latin typeface="Times New Roman" panose="02020603050405020304" pitchFamily="18" charset="0"/>
+              <a:cs typeface="Times New Roman" panose="02020603050405020304" pitchFamily="18" charset="0"/>
+            </a:endParaRPr>
+          </a:p>
           <a:p>
             <a:r>
               <a:rPr lang="en-GB" dirty="0" smtClean="0">
                 <a:latin typeface="Times New Roman" panose="02020603050405020304" pitchFamily="18" charset="0"/>
                 <a:cs typeface="Times New Roman" panose="02020603050405020304" pitchFamily="18" charset="0"/>
               </a:rPr>
-              <a:t>The easier the level the more common the rewards are</a:t>
-            </a:r>
-          </a:p>
-          <a:p>
+              <a:t>Moving </a:t>
+            </a:r>
             <a:r>
               <a:rPr lang="en-GB" dirty="0" smtClean="0">
                 <a:latin typeface="Times New Roman" panose="02020603050405020304" pitchFamily="18" charset="0"/>
                 <a:cs typeface="Times New Roman" panose="02020603050405020304" pitchFamily="18" charset="0"/>
               </a:rPr>
-              <a:t>Players can earn bonuses during the level</a:t>
+              <a:t>across the map to try and escape America </a:t>
             </a:r>
           </a:p>
           <a:p>
@@ -7521,7 +7541,7 @@
                 <a:latin typeface="Times New Roman" panose="02020603050405020304" pitchFamily="18" charset="0"/>
                 <a:cs typeface="Times New Roman" panose="02020603050405020304" pitchFamily="18" charset="0"/>
               </a:rPr>
-              <a:t>Big risk = big rewards</a:t>
+              <a:t>Gather influence/ collectables to earn in game currency</a:t>
             </a:r>
           </a:p>
           <a:p>
@@ -7530,7 +7550,7 @@
                 <a:latin typeface="Times New Roman" panose="02020603050405020304" pitchFamily="18" charset="0"/>
                 <a:cs typeface="Times New Roman" panose="02020603050405020304" pitchFamily="18" charset="0"/>
               </a:rPr>
-              <a:t>After a number of attempts player is recommended help</a:t>
+              <a:t>Player character dies, respawn at last save</a:t>
             </a:r>
           </a:p>
           <a:p>
@@ -7539,16 +7559,54 @@
                 <a:latin typeface="Times New Roman" panose="02020603050405020304" pitchFamily="18" charset="0"/>
                 <a:cs typeface="Times New Roman" panose="02020603050405020304" pitchFamily="18" charset="0"/>
               </a:rPr>
-              <a:t>Both turtling and rushing strategies apply</a:t>
-            </a:r>
-          </a:p>
-          <a:p>
+              <a:t>In the levels the player is introduced to new abilities </a:t>
+            </a:r>
+          </a:p>
+          <a:p>
+            <a:r>
+              <a:rPr lang="en-GB" dirty="0" smtClean="0">
+                <a:latin typeface="Times New Roman" panose="02020603050405020304" pitchFamily="18" charset="0"/>
+                <a:cs typeface="Times New Roman" panose="02020603050405020304" pitchFamily="18" charset="0"/>
+              </a:rPr>
+              <a:t>Empathise with rivals/enemies </a:t>
+            </a:r>
             <a:endParaRPr lang="en-GB" dirty="0" smtClean="0">
               <a:latin typeface="Times New Roman" panose="02020603050405020304" pitchFamily="18" charset="0"/>
               <a:cs typeface="Times New Roman" panose="02020603050405020304" pitchFamily="18" charset="0"/>
             </a:endParaRPr>
           </a:p>
           <a:p>
+            <a:r>
+              <a:rPr lang="en-GB" dirty="0">
+                <a:latin typeface="Times New Roman" panose="02020603050405020304" pitchFamily="18" charset="0"/>
+                <a:cs typeface="Times New Roman" panose="02020603050405020304" pitchFamily="18" charset="0"/>
+              </a:rPr>
+              <a:t>Encounter Political </a:t>
+            </a:r>
+            <a:r>
+              <a:rPr lang="en-GB" dirty="0" smtClean="0">
+                <a:latin typeface="Times New Roman" panose="02020603050405020304" pitchFamily="18" charset="0"/>
+                <a:cs typeface="Times New Roman" panose="02020603050405020304" pitchFamily="18" charset="0"/>
+              </a:rPr>
+              <a:t>characters/Rivals</a:t>
+            </a:r>
+          </a:p>
+          <a:p>
+            <a:r>
+              <a:rPr lang="en-GB" dirty="0">
+                <a:latin typeface="Times New Roman" panose="02020603050405020304" pitchFamily="18" charset="0"/>
+                <a:cs typeface="Times New Roman" panose="02020603050405020304" pitchFamily="18" charset="0"/>
+              </a:rPr>
+              <a:t>Collect articles (Intel) objects in game </a:t>
+            </a:r>
+          </a:p>
+          <a:p>
+            <a:endParaRPr lang="en-GB" dirty="0">
+              <a:latin typeface="Times New Roman" panose="02020603050405020304" pitchFamily="18" charset="0"/>
+              <a:cs typeface="Times New Roman" panose="02020603050405020304" pitchFamily="18" charset="0"/>
+            </a:endParaRPr>
+          </a:p>
+          <a:p>
             <a:endParaRPr lang="en-GB" dirty="0" smtClean="0">
               <a:latin typeface="Times New Roman" panose="02020603050405020304" pitchFamily="18" charset="0"/>
               <a:cs typeface="Times New Roman" panose="02020603050405020304" pitchFamily="18" charset="0"/>
@@ -7556,10 +7614,93 @@
           </a:p>
         </p:txBody>
       </p:sp>
+      <p:pic>
+        <p:nvPicPr>
+          <p:cNvPr id="8" name="Picture 7"/>
+          <p:cNvPicPr>
+            <a:picLocks noChangeAspect="1"/>
+          </p:cNvPicPr>
+          <p:nvPr/>
+        </p:nvPicPr>
+        <p:blipFill>
+          <a:blip r:embed="rId2"/>
+          <a:stretch>
+            <a:fillRect/>
+          </a:stretch>
+        </p:blipFill>
+        <p:spPr>
+          <a:xfrm>
+            <a:off x="6918960" y="4593019"/>
+            <a:ext cx="4709159" cy="2125662"/>
+          </a:xfrm>
+          <a:prstGeom prst="rect">
+            <a:avLst/>
+          </a:prstGeom>
+        </p:spPr>
+      </p:pic>
+      <p:pic>
+        <p:nvPicPr>
+          <p:cNvPr id="7" name="Picture 6"/>
+          <p:cNvPicPr>
+            <a:picLocks noChangeAspect="1"/>
+          </p:cNvPicPr>
+          <p:nvPr/>
+        </p:nvPicPr>
+        <p:blipFill>
+          <a:blip r:embed="rId3" cstate="print">
+            <a:extLst>
+              <a:ext uri="{28A0092B-C50C-407E-A947-70E740481C1C}">
+                <a14:useLocalDpi xmlns:a14="http://schemas.microsoft.com/office/drawing/2010/main" val="0"/>
+              </a:ext>
+            </a:extLst>
+          </a:blip>
+          <a:stretch>
+            <a:fillRect/>
+          </a:stretch>
+        </p:blipFill>
+        <p:spPr>
+          <a:xfrm>
+            <a:off x="8155896" y="788168"/>
+            <a:ext cx="3426504" cy="1780116"/>
+          </a:xfrm>
+          <a:prstGeom prst="rect">
+            <a:avLst/>
+          </a:prstGeom>
+        </p:spPr>
+      </p:pic>
+      <p:pic>
+        <p:nvPicPr>
+          <p:cNvPr id="9" name="Picture 8"/>
+          <p:cNvPicPr>
+            <a:picLocks noChangeAspect="1"/>
+          </p:cNvPicPr>
+          <p:nvPr/>
+        </p:nvPicPr>
+        <p:blipFill rotWithShape="1">
+          <a:blip r:embed="rId4" cstate="print">
+            <a:extLst>
+              <a:ext uri="{28A0092B-C50C-407E-A947-70E740481C1C}">
+                <a14:useLocalDpi xmlns:a14="http://schemas.microsoft.com/office/drawing/2010/main" val="0"/>
+              </a:ext>
+            </a:extLst>
+          </a:blip>
+          <a:srcRect t="4803"/>
+          <a:stretch/>
+        </p:blipFill>
+        <p:spPr>
+          <a:xfrm>
+            <a:off x="8155896" y="2666565"/>
+            <a:ext cx="3411401" cy="1826739"/>
+          </a:xfrm>
+          <a:prstGeom prst="rect">
+            <a:avLst/>
+          </a:prstGeom>
+        </p:spPr>
+      </p:pic>
     </p:spTree>
     <p:extLst>
       <p:ext uri="{BB962C8B-B14F-4D97-AF65-F5344CB8AC3E}">
-        <p14:creationId xmlns:p14="http://schemas.microsoft.com/office/powerpoint/2010/main" val="1388648143"/>
+        <p14:creationId xmlns:p14="http://schemas.microsoft.com/office/powerpoint/2010/main" val="3347684022"/>
       </p:ext>
     </p:extLst>
   </p:cSld>
@@ -7605,7 +7746,7 @@
         </p:nvSpPr>
         <p:spPr>
           <a:xfrm>
-            <a:off x="825529" y="578618"/>
+            <a:off x="825529" y="788168"/>
             <a:ext cx="8534400" cy="1507067"/>
           </a:xfrm>
         </p:spPr>
@@ -7618,7 +7759,7 @@
                 <a:latin typeface="Arial" panose="020B0604020202020204" pitchFamily="34" charset="0"/>
                 <a:cs typeface="Arial" panose="020B0604020202020204" pitchFamily="34" charset="0"/>
               </a:rPr>
-              <a:t>World/Locations</a:t>
+              <a:t>Game Experience</a:t>
             </a:r>
             <a:endParaRPr lang="en-GB" dirty="0">
               <a:latin typeface="Arial" panose="020B0604020202020204" pitchFamily="34" charset="0"/>
@@ -7639,7 +7780,7 @@
         </p:nvSpPr>
         <p:spPr>
           <a:xfrm>
-            <a:off x="825529" y="2223268"/>
+            <a:off x="825529" y="2007310"/>
             <a:ext cx="8534400" cy="3615267"/>
           </a:xfrm>
         </p:spPr>
@@ -7652,7 +7793,7 @@
                 <a:latin typeface="Times New Roman" panose="02020603050405020304" pitchFamily="18" charset="0"/>
                 <a:cs typeface="Times New Roman" panose="02020603050405020304" pitchFamily="18" charset="0"/>
               </a:rPr>
-              <a:t>Iconic Buildings/ structures (Mexican wall) represented</a:t>
+              <a:t>Players will feel sadness towards America and the state its in</a:t>
             </a:r>
           </a:p>
           <a:p>
@@ -7661,7 +7802,7 @@
                 <a:latin typeface="Times New Roman" panose="02020603050405020304" pitchFamily="18" charset="0"/>
                 <a:cs typeface="Times New Roman" panose="02020603050405020304" pitchFamily="18" charset="0"/>
               </a:rPr>
-              <a:t>Cities and states provide difficulty level and rewards</a:t>
+              <a:t>Destruction, no hope, frustration</a:t>
             </a:r>
           </a:p>
           <a:p>
@@ -7670,7 +7811,7 @@
                 <a:latin typeface="Times New Roman" panose="02020603050405020304" pitchFamily="18" charset="0"/>
                 <a:cs typeface="Times New Roman" panose="02020603050405020304" pitchFamily="18" charset="0"/>
               </a:rPr>
-              <a:t>Map of America</a:t>
+              <a:t>Signs of overgrown vegetation </a:t>
             </a:r>
           </a:p>
           <a:p>
@@ -7679,190 +7820,21 @@
                 <a:latin typeface="Times New Roman" panose="02020603050405020304" pitchFamily="18" charset="0"/>
                 <a:cs typeface="Times New Roman" panose="02020603050405020304" pitchFamily="18" charset="0"/>
               </a:rPr>
-              <a:t>Audio included in different scenarios </a:t>
-            </a:r>
-          </a:p>
-          <a:p>
-            <a:r>
-              <a:rPr lang="en-GB" dirty="0" smtClean="0">
-                <a:latin typeface="Times New Roman" panose="02020603050405020304" pitchFamily="18" charset="0"/>
-                <a:cs typeface="Times New Roman" panose="02020603050405020304" pitchFamily="18" charset="0"/>
-              </a:rPr>
-              <a:t>Find intel of real world articles/ news stories</a:t>
-            </a:r>
-          </a:p>
-          <a:p>
-            <a:endParaRPr lang="en-GB" dirty="0" smtClean="0"/>
-          </a:p>
-          <a:p>
-            <a:endParaRPr lang="en-GB" dirty="0" smtClean="0"/>
-          </a:p>
-          <a:p>
-            <a:endParaRPr lang="en-GB" dirty="0"/>
-          </a:p>
-        </p:txBody>
-      </p:sp>
-      <p:pic>
-        <p:nvPicPr>
-          <p:cNvPr id="4" name="Picture 3"/>
-          <p:cNvPicPr>
-            <a:picLocks noChangeAspect="1"/>
-          </p:cNvPicPr>
-          <p:nvPr/>
-        </p:nvPicPr>
-        <p:blipFill rotWithShape="1">
-          <a:blip r:embed="rId2">
-            <a:extLst>
-              <a:ext uri="{28A0092B-C50C-407E-A947-70E740481C1C}">
-                <a14:useLocalDpi xmlns:a14="http://schemas.microsoft.com/office/drawing/2010/main" val="0"/>
-              </a:ext>
-            </a:extLst>
-          </a:blip>
-          <a:srcRect l="9314" r="11070"/>
-          <a:stretch/>
-        </p:blipFill>
-        <p:spPr>
-          <a:xfrm>
-            <a:off x="6934200" y="1079942"/>
-            <a:ext cx="2849880" cy="2011486"/>
-          </a:xfrm>
-          <a:prstGeom prst="rect">
-            <a:avLst/>
-          </a:prstGeom>
-        </p:spPr>
-      </p:pic>
-      <p:pic>
-        <p:nvPicPr>
-          <p:cNvPr id="6" name="Picture 5"/>
-          <p:cNvPicPr>
-            <a:picLocks noChangeAspect="1"/>
-          </p:cNvPicPr>
-          <p:nvPr/>
-        </p:nvPicPr>
-        <p:blipFill>
-          <a:blip r:embed="rId3" cstate="print">
-            <a:extLst>
-              <a:ext uri="{28A0092B-C50C-407E-A947-70E740481C1C}">
-                <a14:useLocalDpi xmlns:a14="http://schemas.microsoft.com/office/drawing/2010/main" val="0"/>
-              </a:ext>
-            </a:extLst>
-          </a:blip>
-          <a:stretch>
-            <a:fillRect/>
-          </a:stretch>
-        </p:blipFill>
-        <p:spPr>
-          <a:xfrm>
-            <a:off x="9921240" y="485485"/>
-            <a:ext cx="2133600" cy="3200400"/>
-          </a:xfrm>
-          <a:prstGeom prst="rect">
-            <a:avLst/>
-          </a:prstGeom>
-        </p:spPr>
-      </p:pic>
-      <p:pic>
-        <p:nvPicPr>
-          <p:cNvPr id="7" name="Picture 6"/>
-          <p:cNvPicPr>
-            <a:picLocks noChangeAspect="1"/>
-          </p:cNvPicPr>
-          <p:nvPr/>
-        </p:nvPicPr>
-        <p:blipFill rotWithShape="1">
-          <a:blip r:embed="rId4" cstate="print">
-            <a:extLst>
-              <a:ext uri="{28A0092B-C50C-407E-A947-70E740481C1C}">
-                <a14:useLocalDpi xmlns:a14="http://schemas.microsoft.com/office/drawing/2010/main" val="0"/>
-              </a:ext>
-            </a:extLst>
-          </a:blip>
-          <a:srcRect l="21073" t="6299" r="22067"/>
-          <a:stretch/>
-        </p:blipFill>
-        <p:spPr>
-          <a:xfrm>
-            <a:off x="9898380" y="3840479"/>
-            <a:ext cx="2179320" cy="2394295"/>
-          </a:xfrm>
-          <a:prstGeom prst="rect">
-            <a:avLst/>
-          </a:prstGeom>
-        </p:spPr>
-      </p:pic>
-      <p:sp>
-        <p:nvSpPr>
-          <p:cNvPr id="8" name="AutoShape 4" descr="https://cdn.vox-cdn.com/thumbor/EZyqrlK4dODpKU_n-WbRlKyYEyo=/0x0:5211x3603/920x0/filters:focal(0x0:5211x3603):format(webp):no_upscale()/cdn.vox-cdn.com/uploads/chorus_asset/file/9686667/shutterstock_344648759.jpg"/>
-          <p:cNvSpPr>
-            <a:spLocks noChangeAspect="1" noChangeArrowheads="1"/>
-          </p:cNvSpPr>
-          <p:nvPr/>
-        </p:nvSpPr>
-        <p:spPr bwMode="auto">
-          <a:xfrm>
-            <a:off x="1922780" y="2085685"/>
-            <a:ext cx="7048500" cy="4876800"/>
-          </a:xfrm>
-          <a:prstGeom prst="rect">
-            <a:avLst/>
-          </a:prstGeom>
-          <a:noFill/>
-          <a:extLst>
-            <a:ext uri="{909E8E84-426E-40DD-AFC4-6F175D3DCCD1}">
-              <a14:hiddenFill xmlns:a14="http://schemas.microsoft.com/office/drawing/2010/main">
-                <a:solidFill>
-                  <a:srgbClr val="FFFFFF"/>
-                </a:solidFill>
-              </a14:hiddenFill>
-            </a:ext>
-          </a:extLst>
-        </p:spPr>
-        <p:txBody>
-          <a:bodyPr vert="horz" wrap="square" lIns="91440" tIns="45720" rIns="91440" bIns="45720" numCol="1" anchor="t" anchorCtr="0" compatLnSpc="1">
-            <a:prstTxWarp prst="textNoShape">
-              <a:avLst/>
-            </a:prstTxWarp>
-          </a:bodyPr>
-          <a:lstStyle/>
-          <a:p>
-            <a:endParaRPr lang="en-GB"/>
-          </a:p>
-        </p:txBody>
-      </p:sp>
-      <p:pic>
-        <p:nvPicPr>
-          <p:cNvPr id="9" name="Picture 8"/>
-          <p:cNvPicPr>
-            <a:picLocks noChangeAspect="1"/>
-          </p:cNvPicPr>
-          <p:nvPr/>
-        </p:nvPicPr>
-        <p:blipFill>
-          <a:blip r:embed="rId5" cstate="print">
-            <a:extLst>
-              <a:ext uri="{28A0092B-C50C-407E-A947-70E740481C1C}">
-                <a14:useLocalDpi xmlns:a14="http://schemas.microsoft.com/office/drawing/2010/main" val="0"/>
-              </a:ext>
-            </a:extLst>
-          </a:blip>
-          <a:stretch>
-            <a:fillRect/>
-          </a:stretch>
-        </p:blipFill>
-        <p:spPr>
-          <a:xfrm>
-            <a:off x="6605241" y="3229011"/>
-            <a:ext cx="3178839" cy="2197919"/>
-          </a:xfrm>
-          <a:prstGeom prst="rect">
-            <a:avLst/>
-          </a:prstGeom>
-        </p:spPr>
-      </p:pic>
+              <a:t>Fun/ laugh towards characters being used</a:t>
+            </a:r>
+          </a:p>
+          <a:p>
+            <a:endParaRPr lang="en-GB" dirty="0" smtClean="0">
+              <a:latin typeface="Times New Roman" panose="02020603050405020304" pitchFamily="18" charset="0"/>
+              <a:cs typeface="Times New Roman" panose="02020603050405020304" pitchFamily="18" charset="0"/>
+            </a:endParaRPr>
+          </a:p>
+        </p:txBody>
+      </p:sp>
     </p:spTree>
     <p:extLst>
       <p:ext uri="{BB962C8B-B14F-4D97-AF65-F5344CB8AC3E}">
-        <p14:creationId xmlns:p14="http://schemas.microsoft.com/office/powerpoint/2010/main" val="456655861"/>
+        <p14:creationId xmlns:p14="http://schemas.microsoft.com/office/powerpoint/2010/main" val="3204707073"/>
       </p:ext>
     </p:extLst>
   </p:cSld>
@@ -7908,7 +7880,7 @@
         </p:nvSpPr>
         <p:spPr>
           <a:xfrm>
-            <a:off x="825529" y="788168"/>
+            <a:off x="825529" y="540518"/>
             <a:ext cx="8534400" cy="1507067"/>
           </a:xfrm>
         </p:spPr>
@@ -7921,7 +7893,7 @@
                 <a:latin typeface="Arial" panose="020B0604020202020204" pitchFamily="34" charset="0"/>
                 <a:cs typeface="Arial" panose="020B0604020202020204" pitchFamily="34" charset="0"/>
               </a:rPr>
-              <a:t>Game Experience</a:t>
+              <a:t>Characters</a:t>
             </a:r>
             <a:endParaRPr lang="en-GB" dirty="0">
               <a:latin typeface="Arial" panose="020B0604020202020204" pitchFamily="34" charset="0"/>
@@ -7942,7 +7914,7 @@
         </p:nvSpPr>
         <p:spPr>
           <a:xfrm>
-            <a:off x="825529" y="2007310"/>
+            <a:off x="825529" y="1763220"/>
             <a:ext cx="8534400" cy="3615267"/>
           </a:xfrm>
         </p:spPr>
@@ -7955,17 +7927,19 @@
                 <a:latin typeface="Times New Roman" panose="02020603050405020304" pitchFamily="18" charset="0"/>
                 <a:cs typeface="Times New Roman" panose="02020603050405020304" pitchFamily="18" charset="0"/>
               </a:rPr>
-              <a:t>Players will feel sadness towards America and the state its in</a:t>
-            </a:r>
-          </a:p>
-          <a:p>
+              <a:t>Players </a:t>
+            </a:r>
             <a:r>
               <a:rPr lang="en-GB" dirty="0" smtClean="0">
                 <a:latin typeface="Times New Roman" panose="02020603050405020304" pitchFamily="18" charset="0"/>
                 <a:cs typeface="Times New Roman" panose="02020603050405020304" pitchFamily="18" charset="0"/>
               </a:rPr>
-              <a:t>Destruction, no hope, frustration</a:t>
-            </a:r>
+              <a:t>Characters</a:t>
+            </a:r>
+            <a:endParaRPr lang="en-GB" dirty="0" smtClean="0">
+              <a:latin typeface="Times New Roman" panose="02020603050405020304" pitchFamily="18" charset="0"/>
+              <a:cs typeface="Times New Roman" panose="02020603050405020304" pitchFamily="18" charset="0"/>
+            </a:endParaRPr>
           </a:p>
           <a:p>
             <a:r>
@@ -7973,7 +7947,7 @@
                 <a:latin typeface="Times New Roman" panose="02020603050405020304" pitchFamily="18" charset="0"/>
                 <a:cs typeface="Times New Roman" panose="02020603050405020304" pitchFamily="18" charset="0"/>
               </a:rPr>
-              <a:t>Signs of overgrown vegetation </a:t>
+              <a:t>Allies (Trump enthusiasts/voters)</a:t>
             </a:r>
           </a:p>
           <a:p>
@@ -7982,21 +7956,274 @@
                 <a:latin typeface="Times New Roman" panose="02020603050405020304" pitchFamily="18" charset="0"/>
                 <a:cs typeface="Times New Roman" panose="02020603050405020304" pitchFamily="18" charset="0"/>
               </a:rPr>
-              <a:t>Fun/ laugh towards characters being used</a:t>
-            </a:r>
-          </a:p>
-          <a:p>
-            <a:endParaRPr lang="en-GB" dirty="0" smtClean="0">
+              <a:t>Enemies (Rival Politicians, American People)</a:t>
+            </a:r>
+          </a:p>
+          <a:p>
+            <a:r>
+              <a:rPr lang="en-GB" dirty="0">
+                <a:latin typeface="Times New Roman" panose="02020603050405020304" pitchFamily="18" charset="0"/>
+                <a:cs typeface="Times New Roman" panose="02020603050405020304" pitchFamily="18" charset="0"/>
+              </a:rPr>
+              <a:t>Heroes </a:t>
+            </a:r>
+            <a:r>
+              <a:rPr lang="en-GB" dirty="0" smtClean="0">
+                <a:latin typeface="Times New Roman" panose="02020603050405020304" pitchFamily="18" charset="0"/>
+                <a:cs typeface="Times New Roman" panose="02020603050405020304" pitchFamily="18" charset="0"/>
+              </a:rPr>
+              <a:t>(Party Members, Secret Service)</a:t>
+            </a:r>
+          </a:p>
+          <a:p>
+            <a:r>
+              <a:rPr lang="en-GB" dirty="0" smtClean="0">
+                <a:latin typeface="Times New Roman" panose="02020603050405020304" pitchFamily="18" charset="0"/>
+                <a:cs typeface="Times New Roman" panose="02020603050405020304" pitchFamily="18" charset="0"/>
+              </a:rPr>
+              <a:t>National Guard &amp; Police</a:t>
+            </a:r>
+          </a:p>
+          <a:p>
+            <a:r>
+              <a:rPr lang="en-GB" dirty="0" smtClean="0">
+                <a:latin typeface="Times New Roman" panose="02020603050405020304" pitchFamily="18" charset="0"/>
+                <a:cs typeface="Times New Roman" panose="02020603050405020304" pitchFamily="18" charset="0"/>
+              </a:rPr>
+              <a:t>Mexican Police &amp; </a:t>
+            </a:r>
+            <a:r>
+              <a:rPr lang="en-GB" dirty="0" smtClean="0">
+                <a:latin typeface="Times New Roman" panose="02020603050405020304" pitchFamily="18" charset="0"/>
+                <a:cs typeface="Times New Roman" panose="02020603050405020304" pitchFamily="18" charset="0"/>
+              </a:rPr>
+              <a:t>People</a:t>
+            </a:r>
+          </a:p>
+          <a:p>
+            <a:r>
+              <a:rPr lang="en-GB" dirty="0" smtClean="0">
+                <a:latin typeface="Times New Roman" panose="02020603050405020304" pitchFamily="18" charset="0"/>
+                <a:cs typeface="Times New Roman" panose="02020603050405020304" pitchFamily="18" charset="0"/>
+              </a:rPr>
+              <a:t>Russian Influencers</a:t>
+            </a:r>
+            <a:endParaRPr lang="en-GB" dirty="0">
               <a:latin typeface="Times New Roman" panose="02020603050405020304" pitchFamily="18" charset="0"/>
               <a:cs typeface="Times New Roman" panose="02020603050405020304" pitchFamily="18" charset="0"/>
             </a:endParaRPr>
           </a:p>
-        </p:txBody>
-      </p:sp>
+          <a:p>
+            <a:endParaRPr lang="en-GB" dirty="0" smtClean="0"/>
+          </a:p>
+        </p:txBody>
+      </p:sp>
+      <p:pic>
+        <p:nvPicPr>
+          <p:cNvPr id="4" name="Picture 3"/>
+          <p:cNvPicPr>
+            <a:picLocks noChangeAspect="1"/>
+          </p:cNvPicPr>
+          <p:nvPr/>
+        </p:nvPicPr>
+        <p:blipFill>
+          <a:blip r:embed="rId2" cstate="print">
+            <a:extLst>
+              <a:ext uri="{28A0092B-C50C-407E-A947-70E740481C1C}">
+                <a14:useLocalDpi xmlns:a14="http://schemas.microsoft.com/office/drawing/2010/main" val="0"/>
+              </a:ext>
+            </a:extLst>
+          </a:blip>
+          <a:stretch>
+            <a:fillRect/>
+          </a:stretch>
+        </p:blipFill>
+        <p:spPr>
+          <a:xfrm>
+            <a:off x="7381775" y="965545"/>
+            <a:ext cx="1708484" cy="2164080"/>
+          </a:xfrm>
+          <a:prstGeom prst="rect">
+            <a:avLst/>
+          </a:prstGeom>
+        </p:spPr>
+      </p:pic>
+      <p:sp>
+        <p:nvSpPr>
+          <p:cNvPr id="5" name="AutoShape 2" descr="Image result for clinton"/>
+          <p:cNvSpPr>
+            <a:spLocks noChangeAspect="1" noChangeArrowheads="1"/>
+          </p:cNvSpPr>
+          <p:nvPr/>
+        </p:nvSpPr>
+        <p:spPr bwMode="auto">
+          <a:xfrm>
+            <a:off x="520729" y="528780"/>
+            <a:ext cx="304800" cy="304800"/>
+          </a:xfrm>
+          <a:prstGeom prst="rect">
+            <a:avLst/>
+          </a:prstGeom>
+          <a:noFill/>
+          <a:extLst>
+            <a:ext uri="{909E8E84-426E-40DD-AFC4-6F175D3DCCD1}">
+              <a14:hiddenFill xmlns:a14="http://schemas.microsoft.com/office/drawing/2010/main">
+                <a:solidFill>
+                  <a:srgbClr val="FFFFFF"/>
+                </a:solidFill>
+              </a14:hiddenFill>
+            </a:ext>
+          </a:extLst>
+        </p:spPr>
+        <p:txBody>
+          <a:bodyPr vert="horz" wrap="square" lIns="91440" tIns="45720" rIns="91440" bIns="45720" numCol="1" anchor="t" anchorCtr="0" compatLnSpc="1">
+            <a:prstTxWarp prst="textNoShape">
+              <a:avLst/>
+            </a:prstTxWarp>
+          </a:bodyPr>
+          <a:lstStyle/>
+          <a:p>
+            <a:endParaRPr lang="en-GB"/>
+          </a:p>
+        </p:txBody>
+      </p:sp>
+      <p:pic>
+        <p:nvPicPr>
+          <p:cNvPr id="8" name="Picture 7"/>
+          <p:cNvPicPr>
+            <a:picLocks noChangeAspect="1"/>
+          </p:cNvPicPr>
+          <p:nvPr/>
+        </p:nvPicPr>
+        <p:blipFill>
+          <a:blip r:embed="rId3" cstate="print">
+            <a:extLst>
+              <a:ext uri="{28A0092B-C50C-407E-A947-70E740481C1C}">
+                <a14:useLocalDpi xmlns:a14="http://schemas.microsoft.com/office/drawing/2010/main" val="0"/>
+              </a:ext>
+            </a:extLst>
+          </a:blip>
+          <a:stretch>
+            <a:fillRect/>
+          </a:stretch>
+        </p:blipFill>
+        <p:spPr>
+          <a:xfrm>
+            <a:off x="9359930" y="965546"/>
+            <a:ext cx="2164080" cy="2164080"/>
+          </a:xfrm>
+          <a:prstGeom prst="rect">
+            <a:avLst/>
+          </a:prstGeom>
+        </p:spPr>
+      </p:pic>
+      <p:pic>
+        <p:nvPicPr>
+          <p:cNvPr id="1032" name="Picture 8" descr="Image result for trump voters&quot;">
+            <a:hlinkClick r:id="rId4"/>
+          </p:cNvPr>
+          <p:cNvPicPr>
+            <a:picLocks noChangeAspect="1" noChangeArrowheads="1"/>
+          </p:cNvPicPr>
+          <p:nvPr/>
+        </p:nvPicPr>
+        <p:blipFill>
+          <a:blip r:embed="rId5">
+            <a:extLst>
+              <a:ext uri="{28A0092B-C50C-407E-A947-70E740481C1C}">
+                <a14:useLocalDpi xmlns:a14="http://schemas.microsoft.com/office/drawing/2010/main" val="0"/>
+              </a:ext>
+            </a:extLst>
+          </a:blip>
+          <a:srcRect/>
+          <a:stretch>
+            <a:fillRect/>
+          </a:stretch>
+        </p:blipFill>
+        <p:spPr bwMode="auto">
+          <a:xfrm>
+            <a:off x="6297295" y="3228685"/>
+            <a:ext cx="2657856" cy="1661160"/>
+          </a:xfrm>
+          <a:prstGeom prst="rect">
+            <a:avLst/>
+          </a:prstGeom>
+          <a:noFill/>
+          <a:extLst>
+            <a:ext uri="{909E8E84-426E-40DD-AFC4-6F175D3DCCD1}">
+              <a14:hiddenFill xmlns:a14="http://schemas.microsoft.com/office/drawing/2010/main">
+                <a:solidFill>
+                  <a:srgbClr val="FFFFFF"/>
+                </a:solidFill>
+              </a14:hiddenFill>
+            </a:ext>
+          </a:extLst>
+        </p:spPr>
+      </p:pic>
+      <p:pic>
+        <p:nvPicPr>
+          <p:cNvPr id="9" name="Picture 8"/>
+          <p:cNvPicPr>
+            <a:picLocks noChangeAspect="1"/>
+          </p:cNvPicPr>
+          <p:nvPr/>
+        </p:nvPicPr>
+        <p:blipFill>
+          <a:blip r:embed="rId6">
+            <a:extLst>
+              <a:ext uri="{28A0092B-C50C-407E-A947-70E740481C1C}">
+                <a14:useLocalDpi xmlns:a14="http://schemas.microsoft.com/office/drawing/2010/main" val="0"/>
+              </a:ext>
+            </a:extLst>
+          </a:blip>
+          <a:stretch>
+            <a:fillRect/>
+          </a:stretch>
+        </p:blipFill>
+        <p:spPr>
+          <a:xfrm>
+            <a:off x="9090259" y="3437926"/>
+            <a:ext cx="2687786" cy="2597113"/>
+          </a:xfrm>
+          <a:prstGeom prst="rect">
+            <a:avLst/>
+          </a:prstGeom>
+        </p:spPr>
+      </p:pic>
+      <p:pic>
+        <p:nvPicPr>
+          <p:cNvPr id="11" name="Picture 10"/>
+          <p:cNvPicPr>
+            <a:picLocks noChangeAspect="1"/>
+          </p:cNvPicPr>
+          <p:nvPr/>
+        </p:nvPicPr>
+        <p:blipFill>
+          <a:blip r:embed="rId7">
+            <a:extLst>
+              <a:ext uri="{28A0092B-C50C-407E-A947-70E740481C1C}">
+                <a14:useLocalDpi xmlns:a14="http://schemas.microsoft.com/office/drawing/2010/main" val="0"/>
+              </a:ext>
+            </a:extLst>
+          </a:blip>
+          <a:stretch>
+            <a:fillRect/>
+          </a:stretch>
+        </p:blipFill>
+        <p:spPr>
+          <a:xfrm>
+            <a:off x="6284963" y="4940990"/>
+            <a:ext cx="2670188" cy="1367137"/>
+          </a:xfrm>
+          <a:prstGeom prst="rect">
+            <a:avLst/>
+          </a:prstGeom>
+        </p:spPr>
+      </p:pic>
     </p:spTree>
     <p:extLst>
       <p:ext uri="{BB962C8B-B14F-4D97-AF65-F5344CB8AC3E}">
-        <p14:creationId xmlns:p14="http://schemas.microsoft.com/office/powerpoint/2010/main" val="3204707073"/>
+        <p14:creationId xmlns:p14="http://schemas.microsoft.com/office/powerpoint/2010/main" val="2689151660"/>
       </p:ext>
     </p:extLst>
   </p:cSld>

</xml_diff>